<commit_message>
adicionando: pasta cors - WebConfig class
</commit_message>
<xml_diff>
--- a/src/main/docs/TEMPLATE - Projeto Interdisciplinar.pptx
+++ b/src/main/docs/TEMPLATE - Projeto Interdisciplinar.pptx
@@ -5,7 +5,7 @@
     <p:sldMasterId id="2147483648" r:id="rId1"/>
   </p:sldMasterIdLst>
   <p:notesMasterIdLst>
-    <p:notesMasterId r:id="rId14"/>
+    <p:notesMasterId r:id="rId15"/>
   </p:notesMasterIdLst>
   <p:sldIdLst>
     <p:sldId id="262" r:id="rId2"/>
@@ -20,6 +20,7 @@
     <p:sldId id="263" r:id="rId11"/>
     <p:sldId id="260" r:id="rId12"/>
     <p:sldId id="261" r:id="rId13"/>
+    <p:sldId id="269" r:id="rId14"/>
   </p:sldIdLst>
   <p:sldSz cx="24384000" cy="13716000"/>
   <p:notesSz cx="6858000" cy="9144000"/>
@@ -3843,7 +3844,7 @@
           </a:ln>
           <a:extLst>
             <a:ext uri="{C572A759-6A51-4108-AA02-DFA0A04FC94B}">
-              <ma14:wrappingTextBoxFlag xmlns="" xmlns:m="http://schemas.openxmlformats.org/officeDocument/2006/math" xmlns:a14="http://schemas.microsoft.com/office/drawing/2010/main" xmlns:ma14="http://schemas.microsoft.com/office/mac/drawingml/2011/main" val="1"/>
+              <ma14:wrappingTextBoxFlag xmlns:ma14="http://schemas.microsoft.com/office/mac/drawingml/2011/main" xmlns:a14="http://schemas.microsoft.com/office/drawing/2010/main" xmlns:m="http://schemas.openxmlformats.org/officeDocument/2006/math" xmlns="" val="1"/>
             </a:ext>
           </a:extLst>
         </p:spPr>
@@ -3882,7 +3883,7 @@
           </a:ln>
           <a:extLst>
             <a:ext uri="{C572A759-6A51-4108-AA02-DFA0A04FC94B}">
-              <ma14:wrappingTextBoxFlag xmlns="" xmlns:m="http://schemas.openxmlformats.org/officeDocument/2006/math" xmlns:a14="http://schemas.microsoft.com/office/drawing/2010/main" xmlns:ma14="http://schemas.microsoft.com/office/mac/drawingml/2011/main" val="1"/>
+              <ma14:wrappingTextBoxFlag xmlns:ma14="http://schemas.microsoft.com/office/mac/drawingml/2011/main" xmlns:a14="http://schemas.microsoft.com/office/drawing/2010/main" xmlns:m="http://schemas.openxmlformats.org/officeDocument/2006/math" xmlns="" val="1"/>
             </a:ext>
           </a:extLst>
         </p:spPr>
@@ -4833,7 +4834,7 @@
           <p:cNvPr id="5" name="Line 12">
             <a:extLst>
               <a:ext uri="{FF2B5EF4-FFF2-40B4-BE49-F238E27FC236}">
-                <a16:creationId xmlns:a16="http://schemas.microsoft.com/office/drawing/2014/main" id="{AFE91702-C27F-40D7-B119-DDE9D1BFBF1E}"/>
+                <a16:creationId xmlns:a16="http://schemas.microsoft.com/office/drawing/2014/main" xmlns="" id="{AFE91702-C27F-40D7-B119-DDE9D1BFBF1E}"/>
               </a:ext>
             </a:extLst>
           </p:cNvPr>
@@ -5023,7 +5024,7 @@
                 <a:effectLst/>
                 <a:extLst>
                   <a:ext uri="{C572A759-6A51-4108-AA02-DFA0A04FC94B}">
-                    <ma14:wrappingTextBoxFlag xmlns="" xmlns:m="http://schemas.openxmlformats.org/officeDocument/2006/math" xmlns:a14="http://schemas.microsoft.com/office/drawing/2010/main" xmlns:ma14="http://schemas.microsoft.com/office/mac/drawingml/2011/main" val="1"/>
+                    <ma14:wrappingTextBoxFlag xmlns:ma14="http://schemas.microsoft.com/office/mac/drawingml/2011/main" xmlns:a14="http://schemas.microsoft.com/office/drawing/2010/main" xmlns:m="http://schemas.openxmlformats.org/officeDocument/2006/math" xmlns="" val="1"/>
                   </a:ext>
                 </a:extLst>
               </p:spPr>
@@ -5075,7 +5076,7 @@
               <a:effectLst/>
               <a:extLst>
                 <a:ext uri="{C572A759-6A51-4108-AA02-DFA0A04FC94B}">
-                  <ma14:wrappingTextBoxFlag xmlns="" xmlns:m="http://schemas.openxmlformats.org/officeDocument/2006/math" xmlns:a14="http://schemas.microsoft.com/office/drawing/2010/main" xmlns:ma14="http://schemas.microsoft.com/office/mac/drawingml/2011/main" val="1"/>
+                  <ma14:wrappingTextBoxFlag xmlns:ma14="http://schemas.microsoft.com/office/mac/drawingml/2011/main" xmlns:a14="http://schemas.microsoft.com/office/drawing/2010/main" xmlns:m="http://schemas.openxmlformats.org/officeDocument/2006/math" xmlns="" val="1"/>
                 </a:ext>
               </a:extLst>
             </p:spPr>
@@ -5277,7 +5278,7 @@
                 <a:effectLst/>
                 <a:extLst>
                   <a:ext uri="{C572A759-6A51-4108-AA02-DFA0A04FC94B}">
-                    <ma14:wrappingTextBoxFlag xmlns="" xmlns:m="http://schemas.openxmlformats.org/officeDocument/2006/math" xmlns:a14="http://schemas.microsoft.com/office/drawing/2010/main" xmlns:ma14="http://schemas.microsoft.com/office/mac/drawingml/2011/main" val="1"/>
+                    <ma14:wrappingTextBoxFlag xmlns:ma14="http://schemas.microsoft.com/office/mac/drawingml/2011/main" xmlns:a14="http://schemas.microsoft.com/office/drawing/2010/main" xmlns:m="http://schemas.openxmlformats.org/officeDocument/2006/math" xmlns="" val="1"/>
                   </a:ext>
                 </a:extLst>
               </p:spPr>
@@ -5328,7 +5329,7 @@
               <a:effectLst/>
               <a:extLst>
                 <a:ext uri="{C572A759-6A51-4108-AA02-DFA0A04FC94B}">
-                  <ma14:wrappingTextBoxFlag xmlns="" xmlns:m="http://schemas.openxmlformats.org/officeDocument/2006/math" xmlns:a14="http://schemas.microsoft.com/office/drawing/2010/main" xmlns:ma14="http://schemas.microsoft.com/office/mac/drawingml/2011/main" val="1"/>
+                  <ma14:wrappingTextBoxFlag xmlns:ma14="http://schemas.microsoft.com/office/mac/drawingml/2011/main" xmlns:a14="http://schemas.microsoft.com/office/drawing/2010/main" xmlns:m="http://schemas.openxmlformats.org/officeDocument/2006/math" xmlns="" val="1"/>
                 </a:ext>
               </a:extLst>
             </p:spPr>
@@ -5500,7 +5501,7 @@
                 <a:effectLst/>
                 <a:extLst>
                   <a:ext uri="{C572A759-6A51-4108-AA02-DFA0A04FC94B}">
-                    <ma14:wrappingTextBoxFlag xmlns="" xmlns:m="http://schemas.openxmlformats.org/officeDocument/2006/math" xmlns:a14="http://schemas.microsoft.com/office/drawing/2010/main" xmlns:ma14="http://schemas.microsoft.com/office/mac/drawingml/2011/main" val="1"/>
+                    <ma14:wrappingTextBoxFlag xmlns:ma14="http://schemas.microsoft.com/office/mac/drawingml/2011/main" xmlns:a14="http://schemas.microsoft.com/office/drawing/2010/main" xmlns:m="http://schemas.openxmlformats.org/officeDocument/2006/math" xmlns="" val="1"/>
                   </a:ext>
                 </a:extLst>
               </p:spPr>
@@ -5551,7 +5552,7 @@
               <a:effectLst/>
               <a:extLst>
                 <a:ext uri="{C572A759-6A51-4108-AA02-DFA0A04FC94B}">
-                  <ma14:wrappingTextBoxFlag xmlns="" xmlns:m="http://schemas.openxmlformats.org/officeDocument/2006/math" xmlns:a14="http://schemas.microsoft.com/office/drawing/2010/main" xmlns:ma14="http://schemas.microsoft.com/office/mac/drawingml/2011/main" val="1"/>
+                  <ma14:wrappingTextBoxFlag xmlns:ma14="http://schemas.microsoft.com/office/mac/drawingml/2011/main" xmlns:a14="http://schemas.microsoft.com/office/drawing/2010/main" xmlns:m="http://schemas.openxmlformats.org/officeDocument/2006/math" xmlns="" val="1"/>
                 </a:ext>
               </a:extLst>
             </p:spPr>
@@ -5733,7 +5734,7 @@
                 <a:effectLst/>
                 <a:extLst>
                   <a:ext uri="{C572A759-6A51-4108-AA02-DFA0A04FC94B}">
-                    <ma14:wrappingTextBoxFlag xmlns="" xmlns:m="http://schemas.openxmlformats.org/officeDocument/2006/math" xmlns:a14="http://schemas.microsoft.com/office/drawing/2010/main" xmlns:ma14="http://schemas.microsoft.com/office/mac/drawingml/2011/main" val="1"/>
+                    <ma14:wrappingTextBoxFlag xmlns:ma14="http://schemas.microsoft.com/office/mac/drawingml/2011/main" xmlns:a14="http://schemas.microsoft.com/office/drawing/2010/main" xmlns:m="http://schemas.openxmlformats.org/officeDocument/2006/math" xmlns="" val="1"/>
                   </a:ext>
                 </a:extLst>
               </p:spPr>
@@ -5784,7 +5785,7 @@
               <a:effectLst/>
               <a:extLst>
                 <a:ext uri="{C572A759-6A51-4108-AA02-DFA0A04FC94B}">
-                  <ma14:wrappingTextBoxFlag xmlns="" xmlns:m="http://schemas.openxmlformats.org/officeDocument/2006/math" xmlns:a14="http://schemas.microsoft.com/office/drawing/2010/main" xmlns:ma14="http://schemas.microsoft.com/office/mac/drawingml/2011/main" val="1"/>
+                  <ma14:wrappingTextBoxFlag xmlns:ma14="http://schemas.microsoft.com/office/mac/drawingml/2011/main" xmlns:a14="http://schemas.microsoft.com/office/drawing/2010/main" xmlns:m="http://schemas.openxmlformats.org/officeDocument/2006/math" xmlns="" val="1"/>
                 </a:ext>
               </a:extLst>
             </p:spPr>
@@ -5940,7 +5941,7 @@
               <a:effectLst/>
               <a:extLst>
                 <a:ext uri="{C572A759-6A51-4108-AA02-DFA0A04FC94B}">
-                  <ma14:wrappingTextBoxFlag xmlns="" xmlns:m="http://schemas.openxmlformats.org/officeDocument/2006/math" xmlns:a14="http://schemas.microsoft.com/office/drawing/2010/main" xmlns:ma14="http://schemas.microsoft.com/office/mac/drawingml/2011/main" val="1"/>
+                  <ma14:wrappingTextBoxFlag xmlns:ma14="http://schemas.microsoft.com/office/mac/drawingml/2011/main" xmlns:a14="http://schemas.microsoft.com/office/drawing/2010/main" xmlns:m="http://schemas.openxmlformats.org/officeDocument/2006/math" xmlns="" val="1"/>
                 </a:ext>
               </a:extLst>
             </p:spPr>
@@ -6049,7 +6050,7 @@
               <a:effectLst/>
               <a:extLst>
                 <a:ext uri="{C572A759-6A51-4108-AA02-DFA0A04FC94B}">
-                  <ma14:wrappingTextBoxFlag xmlns="" xmlns:m="http://schemas.openxmlformats.org/officeDocument/2006/math" xmlns:a14="http://schemas.microsoft.com/office/drawing/2010/main" xmlns:ma14="http://schemas.microsoft.com/office/mac/drawingml/2011/main" val="1"/>
+                  <ma14:wrappingTextBoxFlag xmlns:ma14="http://schemas.microsoft.com/office/mac/drawingml/2011/main" xmlns:a14="http://schemas.microsoft.com/office/drawing/2010/main" xmlns:m="http://schemas.openxmlformats.org/officeDocument/2006/math" xmlns="" val="1"/>
                 </a:ext>
               </a:extLst>
             </p:spPr>
@@ -6172,7 +6173,7 @@
                 <a:effectLst/>
                 <a:extLst>
                   <a:ext uri="{C572A759-6A51-4108-AA02-DFA0A04FC94B}">
-                    <ma14:wrappingTextBoxFlag xmlns="" xmlns:m="http://schemas.openxmlformats.org/officeDocument/2006/math" xmlns:a14="http://schemas.microsoft.com/office/drawing/2010/main" xmlns:ma14="http://schemas.microsoft.com/office/mac/drawingml/2011/main" val="1"/>
+                    <ma14:wrappingTextBoxFlag xmlns:ma14="http://schemas.microsoft.com/office/mac/drawingml/2011/main" xmlns:a14="http://schemas.microsoft.com/office/drawing/2010/main" xmlns:m="http://schemas.openxmlformats.org/officeDocument/2006/math" xmlns="" val="1"/>
                   </a:ext>
                 </a:extLst>
               </p:spPr>
@@ -6223,7 +6224,7 @@
               <a:effectLst/>
               <a:extLst>
                 <a:ext uri="{C572A759-6A51-4108-AA02-DFA0A04FC94B}">
-                  <ma14:wrappingTextBoxFlag xmlns="" xmlns:m="http://schemas.openxmlformats.org/officeDocument/2006/math" xmlns:a14="http://schemas.microsoft.com/office/drawing/2010/main" xmlns:ma14="http://schemas.microsoft.com/office/mac/drawingml/2011/main" val="1"/>
+                  <ma14:wrappingTextBoxFlag xmlns:ma14="http://schemas.microsoft.com/office/mac/drawingml/2011/main" xmlns:a14="http://schemas.microsoft.com/office/drawing/2010/main" xmlns:m="http://schemas.openxmlformats.org/officeDocument/2006/math" xmlns="" val="1"/>
                 </a:ext>
               </a:extLst>
             </p:spPr>
@@ -6366,7 +6367,7 @@
               <a:effectLst/>
               <a:extLst>
                 <a:ext uri="{C572A759-6A51-4108-AA02-DFA0A04FC94B}">
-                  <ma14:wrappingTextBoxFlag xmlns="" xmlns:m="http://schemas.openxmlformats.org/officeDocument/2006/math" xmlns:a14="http://schemas.microsoft.com/office/drawing/2010/main" xmlns:ma14="http://schemas.microsoft.com/office/mac/drawingml/2011/main" val="1"/>
+                  <ma14:wrappingTextBoxFlag xmlns:ma14="http://schemas.microsoft.com/office/mac/drawingml/2011/main" xmlns:a14="http://schemas.microsoft.com/office/drawing/2010/main" xmlns:m="http://schemas.openxmlformats.org/officeDocument/2006/math" xmlns="" val="1"/>
                 </a:ext>
               </a:extLst>
             </p:spPr>
@@ -6475,7 +6476,7 @@
               <a:effectLst/>
               <a:extLst>
                 <a:ext uri="{C572A759-6A51-4108-AA02-DFA0A04FC94B}">
-                  <ma14:wrappingTextBoxFlag xmlns="" xmlns:m="http://schemas.openxmlformats.org/officeDocument/2006/math" xmlns:a14="http://schemas.microsoft.com/office/drawing/2010/main" xmlns:ma14="http://schemas.microsoft.com/office/mac/drawingml/2011/main" val="1"/>
+                  <ma14:wrappingTextBoxFlag xmlns:ma14="http://schemas.microsoft.com/office/mac/drawingml/2011/main" xmlns:a14="http://schemas.microsoft.com/office/drawing/2010/main" xmlns:m="http://schemas.openxmlformats.org/officeDocument/2006/math" xmlns="" val="1"/>
                 </a:ext>
               </a:extLst>
             </p:spPr>
@@ -6510,7 +6511,7 @@
           <p:cNvPr id="2" name="[a preencher]">
             <a:extLst>
               <a:ext uri="{FF2B5EF4-FFF2-40B4-BE49-F238E27FC236}">
-                <a16:creationId xmlns:a16="http://schemas.microsoft.com/office/drawing/2014/main" id="{DB77B436-339E-6DF7-1522-43FD7F561C13}"/>
+                <a16:creationId xmlns:a16="http://schemas.microsoft.com/office/drawing/2014/main" xmlns="" id="{DB77B436-339E-6DF7-1522-43FD7F561C13}"/>
               </a:ext>
             </a:extLst>
           </p:cNvPr>
@@ -6533,7 +6534,7 @@
           <a:effectLst/>
           <a:extLst>
             <a:ext uri="{C572A759-6A51-4108-AA02-DFA0A04FC94B}">
-              <ma14:wrappingTextBoxFlag xmlns="" xmlns:m="http://schemas.openxmlformats.org/officeDocument/2006/math" xmlns:a14="http://schemas.microsoft.com/office/drawing/2010/main" xmlns:ma14="http://schemas.microsoft.com/office/mac/drawingml/2011/main" val="1"/>
+              <ma14:wrappingTextBoxFlag xmlns:ma14="http://schemas.microsoft.com/office/mac/drawingml/2011/main" xmlns:a14="http://schemas.microsoft.com/office/drawing/2010/main" xmlns:m="http://schemas.openxmlformats.org/officeDocument/2006/math" xmlns="" val="1"/>
             </a:ext>
           </a:extLst>
         </p:spPr>
@@ -6567,7 +6568,7 @@
           <p:cNvPr id="3" name="[a preencher]">
             <a:extLst>
               <a:ext uri="{FF2B5EF4-FFF2-40B4-BE49-F238E27FC236}">
-                <a16:creationId xmlns:a16="http://schemas.microsoft.com/office/drawing/2014/main" id="{7D000957-0D50-B415-4C39-C9F4397E8273}"/>
+                <a16:creationId xmlns:a16="http://schemas.microsoft.com/office/drawing/2014/main" xmlns="" id="{7D000957-0D50-B415-4C39-C9F4397E8273}"/>
               </a:ext>
             </a:extLst>
           </p:cNvPr>
@@ -6624,7 +6625,7 @@
           <a:effectLst/>
           <a:extLst>
             <a:ext uri="{C572A759-6A51-4108-AA02-DFA0A04FC94B}">
-              <ma14:wrappingTextBoxFlag xmlns="" xmlns:m="http://schemas.openxmlformats.org/officeDocument/2006/math" xmlns:a14="http://schemas.microsoft.com/office/drawing/2010/main" xmlns:ma14="http://schemas.microsoft.com/office/mac/drawingml/2011/main" val="1"/>
+              <ma14:wrappingTextBoxFlag xmlns:ma14="http://schemas.microsoft.com/office/mac/drawingml/2011/main" xmlns:a14="http://schemas.microsoft.com/office/drawing/2010/main" xmlns:m="http://schemas.openxmlformats.org/officeDocument/2006/math" xmlns="" val="1"/>
             </a:ext>
           </a:extLst>
         </p:spPr>
@@ -6670,7 +6671,7 @@
           <p:cNvPr id="4" name="[a preencher]">
             <a:extLst>
               <a:ext uri="{FF2B5EF4-FFF2-40B4-BE49-F238E27FC236}">
-                <a16:creationId xmlns:a16="http://schemas.microsoft.com/office/drawing/2014/main" id="{8BA39BCB-81FF-4F71-DEE1-5EFA3B31CBBA}"/>
+                <a16:creationId xmlns:a16="http://schemas.microsoft.com/office/drawing/2014/main" xmlns="" id="{8BA39BCB-81FF-4F71-DEE1-5EFA3B31CBBA}"/>
               </a:ext>
             </a:extLst>
           </p:cNvPr>
@@ -6693,7 +6694,7 @@
           <a:effectLst/>
           <a:extLst>
             <a:ext uri="{C572A759-6A51-4108-AA02-DFA0A04FC94B}">
-              <ma14:wrappingTextBoxFlag xmlns="" xmlns:m="http://schemas.openxmlformats.org/officeDocument/2006/math" xmlns:a14="http://schemas.microsoft.com/office/drawing/2010/main" xmlns:ma14="http://schemas.microsoft.com/office/mac/drawingml/2011/main" val="1"/>
+              <ma14:wrappingTextBoxFlag xmlns:ma14="http://schemas.microsoft.com/office/mac/drawingml/2011/main" xmlns:a14="http://schemas.microsoft.com/office/drawing/2010/main" xmlns:m="http://schemas.openxmlformats.org/officeDocument/2006/math" xmlns="" val="1"/>
             </a:ext>
           </a:extLst>
         </p:spPr>
@@ -6944,7 +6945,7 @@
           <p:cNvPr id="5" name="[a preencher]">
             <a:extLst>
               <a:ext uri="{FF2B5EF4-FFF2-40B4-BE49-F238E27FC236}">
-                <a16:creationId xmlns:a16="http://schemas.microsoft.com/office/drawing/2014/main" id="{3540FA58-3D31-33FF-E732-40E7CC964D8F}"/>
+                <a16:creationId xmlns:a16="http://schemas.microsoft.com/office/drawing/2014/main" xmlns="" id="{3540FA58-3D31-33FF-E732-40E7CC964D8F}"/>
               </a:ext>
             </a:extLst>
           </p:cNvPr>
@@ -6967,7 +6968,7 @@
           <a:effectLst/>
           <a:extLst>
             <a:ext uri="{C572A759-6A51-4108-AA02-DFA0A04FC94B}">
-              <ma14:wrappingTextBoxFlag xmlns="" xmlns:m="http://schemas.openxmlformats.org/officeDocument/2006/math" xmlns:a14="http://schemas.microsoft.com/office/drawing/2010/main" xmlns:ma14="http://schemas.microsoft.com/office/mac/drawingml/2011/main" val="1"/>
+              <ma14:wrappingTextBoxFlag xmlns:ma14="http://schemas.microsoft.com/office/mac/drawingml/2011/main" xmlns:a14="http://schemas.microsoft.com/office/drawing/2010/main" xmlns:m="http://schemas.openxmlformats.org/officeDocument/2006/math" xmlns="" val="1"/>
             </a:ext>
           </a:extLst>
         </p:spPr>
@@ -7171,7 +7172,7 @@
               <a:effectLst/>
               <a:extLst>
                 <a:ext uri="{C572A759-6A51-4108-AA02-DFA0A04FC94B}">
-                  <ma14:wrappingTextBoxFlag xmlns="" xmlns:m="http://schemas.openxmlformats.org/officeDocument/2006/math" xmlns:a14="http://schemas.microsoft.com/office/drawing/2010/main" xmlns:ma14="http://schemas.microsoft.com/office/mac/drawingml/2011/main" val="1"/>
+                  <ma14:wrappingTextBoxFlag xmlns:ma14="http://schemas.microsoft.com/office/mac/drawingml/2011/main" xmlns:a14="http://schemas.microsoft.com/office/drawing/2010/main" xmlns:m="http://schemas.openxmlformats.org/officeDocument/2006/math" xmlns="" val="1"/>
                 </a:ext>
               </a:extLst>
             </p:spPr>
@@ -7280,7 +7281,7 @@
               <a:effectLst/>
               <a:extLst>
                 <a:ext uri="{C572A759-6A51-4108-AA02-DFA0A04FC94B}">
-                  <ma14:wrappingTextBoxFlag xmlns="" xmlns:m="http://schemas.openxmlformats.org/officeDocument/2006/math" xmlns:a14="http://schemas.microsoft.com/office/drawing/2010/main" xmlns:ma14="http://schemas.microsoft.com/office/mac/drawingml/2011/main" val="1"/>
+                  <ma14:wrappingTextBoxFlag xmlns:ma14="http://schemas.microsoft.com/office/mac/drawingml/2011/main" xmlns:a14="http://schemas.microsoft.com/office/drawing/2010/main" xmlns:m="http://schemas.openxmlformats.org/officeDocument/2006/math" xmlns="" val="1"/>
                 </a:ext>
               </a:extLst>
             </p:spPr>
@@ -7389,7 +7390,7 @@
               <a:effectLst/>
               <a:extLst>
                 <a:ext uri="{C572A759-6A51-4108-AA02-DFA0A04FC94B}">
-                  <ma14:wrappingTextBoxFlag xmlns="" xmlns:m="http://schemas.openxmlformats.org/officeDocument/2006/math" xmlns:a14="http://schemas.microsoft.com/office/drawing/2010/main" xmlns:ma14="http://schemas.microsoft.com/office/mac/drawingml/2011/main" val="1"/>
+                  <ma14:wrappingTextBoxFlag xmlns:ma14="http://schemas.microsoft.com/office/mac/drawingml/2011/main" xmlns:a14="http://schemas.microsoft.com/office/drawing/2010/main" xmlns:m="http://schemas.openxmlformats.org/officeDocument/2006/math" xmlns="" val="1"/>
                 </a:ext>
               </a:extLst>
             </p:spPr>
@@ -7498,7 +7499,7 @@
               <a:effectLst/>
               <a:extLst>
                 <a:ext uri="{C572A759-6A51-4108-AA02-DFA0A04FC94B}">
-                  <ma14:wrappingTextBoxFlag xmlns="" xmlns:m="http://schemas.openxmlformats.org/officeDocument/2006/math" xmlns:a14="http://schemas.microsoft.com/office/drawing/2010/main" xmlns:ma14="http://schemas.microsoft.com/office/mac/drawingml/2011/main" val="1"/>
+                  <ma14:wrappingTextBoxFlag xmlns:ma14="http://schemas.microsoft.com/office/mac/drawingml/2011/main" xmlns:a14="http://schemas.microsoft.com/office/drawing/2010/main" xmlns:m="http://schemas.openxmlformats.org/officeDocument/2006/math" xmlns="" val="1"/>
                 </a:ext>
               </a:extLst>
             </p:spPr>
@@ -7607,7 +7608,7 @@
               <a:effectLst/>
               <a:extLst>
                 <a:ext uri="{C572A759-6A51-4108-AA02-DFA0A04FC94B}">
-                  <ma14:wrappingTextBoxFlag xmlns="" xmlns:m="http://schemas.openxmlformats.org/officeDocument/2006/math" xmlns:a14="http://schemas.microsoft.com/office/drawing/2010/main" xmlns:ma14="http://schemas.microsoft.com/office/mac/drawingml/2011/main" val="1"/>
+                  <ma14:wrappingTextBoxFlag xmlns:ma14="http://schemas.microsoft.com/office/mac/drawingml/2011/main" xmlns:a14="http://schemas.microsoft.com/office/drawing/2010/main" xmlns:m="http://schemas.openxmlformats.org/officeDocument/2006/math" xmlns="" val="1"/>
                 </a:ext>
               </a:extLst>
             </p:spPr>
@@ -7642,7 +7643,7 @@
           <p:cNvPr id="2" name="[a preencher]">
             <a:extLst>
               <a:ext uri="{FF2B5EF4-FFF2-40B4-BE49-F238E27FC236}">
-                <a16:creationId xmlns:a16="http://schemas.microsoft.com/office/drawing/2014/main" id="{D2829F0A-C5EE-29D1-F3D1-F0F1DED3E167}"/>
+                <a16:creationId xmlns:a16="http://schemas.microsoft.com/office/drawing/2014/main" xmlns="" id="{D2829F0A-C5EE-29D1-F3D1-F0F1DED3E167}"/>
               </a:ext>
             </a:extLst>
           </p:cNvPr>
@@ -7665,7 +7666,7 @@
           <a:effectLst/>
           <a:extLst>
             <a:ext uri="{C572A759-6A51-4108-AA02-DFA0A04FC94B}">
-              <ma14:wrappingTextBoxFlag xmlns="" xmlns:m="http://schemas.openxmlformats.org/officeDocument/2006/math" xmlns:a14="http://schemas.microsoft.com/office/drawing/2010/main" xmlns:ma14="http://schemas.microsoft.com/office/mac/drawingml/2011/main" val="1"/>
+              <ma14:wrappingTextBoxFlag xmlns:ma14="http://schemas.microsoft.com/office/mac/drawingml/2011/main" xmlns:a14="http://schemas.microsoft.com/office/drawing/2010/main" xmlns:m="http://schemas.openxmlformats.org/officeDocument/2006/math" xmlns="" val="1"/>
             </a:ext>
           </a:extLst>
         </p:spPr>
@@ -7800,7 +7801,7 @@
           <p:cNvPr id="3" name="[a preencher]">
             <a:extLst>
               <a:ext uri="{FF2B5EF4-FFF2-40B4-BE49-F238E27FC236}">
-                <a16:creationId xmlns:a16="http://schemas.microsoft.com/office/drawing/2014/main" id="{41F0DA49-9DFD-322C-50F2-882203F48A3F}"/>
+                <a16:creationId xmlns:a16="http://schemas.microsoft.com/office/drawing/2014/main" xmlns="" id="{41F0DA49-9DFD-322C-50F2-882203F48A3F}"/>
               </a:ext>
             </a:extLst>
           </p:cNvPr>
@@ -7823,7 +7824,7 @@
           <a:effectLst/>
           <a:extLst>
             <a:ext uri="{C572A759-6A51-4108-AA02-DFA0A04FC94B}">
-              <ma14:wrappingTextBoxFlag xmlns="" xmlns:m="http://schemas.openxmlformats.org/officeDocument/2006/math" xmlns:a14="http://schemas.microsoft.com/office/drawing/2010/main" xmlns:ma14="http://schemas.microsoft.com/office/mac/drawingml/2011/main" val="1"/>
+              <ma14:wrappingTextBoxFlag xmlns:ma14="http://schemas.microsoft.com/office/mac/drawingml/2011/main" xmlns:a14="http://schemas.microsoft.com/office/drawing/2010/main" xmlns:m="http://schemas.openxmlformats.org/officeDocument/2006/math" xmlns="" val="1"/>
             </a:ext>
           </a:extLst>
         </p:spPr>
@@ -7900,7 +7901,7 @@
           <p:cNvPr id="4" name="[a preencher]">
             <a:extLst>
               <a:ext uri="{FF2B5EF4-FFF2-40B4-BE49-F238E27FC236}">
-                <a16:creationId xmlns:a16="http://schemas.microsoft.com/office/drawing/2014/main" id="{F52E2190-4139-2AA5-93A1-2B2389CC3E36}"/>
+                <a16:creationId xmlns:a16="http://schemas.microsoft.com/office/drawing/2014/main" xmlns="" id="{F52E2190-4139-2AA5-93A1-2B2389CC3E36}"/>
               </a:ext>
             </a:extLst>
           </p:cNvPr>
@@ -7923,7 +7924,7 @@
           <a:effectLst/>
           <a:extLst>
             <a:ext uri="{C572A759-6A51-4108-AA02-DFA0A04FC94B}">
-              <ma14:wrappingTextBoxFlag xmlns="" xmlns:m="http://schemas.openxmlformats.org/officeDocument/2006/math" xmlns:a14="http://schemas.microsoft.com/office/drawing/2010/main" xmlns:ma14="http://schemas.microsoft.com/office/mac/drawingml/2011/main" val="1"/>
+              <ma14:wrappingTextBoxFlag xmlns:ma14="http://schemas.microsoft.com/office/mac/drawingml/2011/main" xmlns:a14="http://schemas.microsoft.com/office/drawing/2010/main" xmlns:m="http://schemas.openxmlformats.org/officeDocument/2006/math" xmlns="" val="1"/>
             </a:ext>
           </a:extLst>
         </p:spPr>
@@ -8063,7 +8064,7 @@
           <p:cNvPr id="5" name="[a preencher]">
             <a:extLst>
               <a:ext uri="{FF2B5EF4-FFF2-40B4-BE49-F238E27FC236}">
-                <a16:creationId xmlns:a16="http://schemas.microsoft.com/office/drawing/2014/main" id="{6836361F-EB9B-F2F9-8DB9-D767C8FACEA0}"/>
+                <a16:creationId xmlns:a16="http://schemas.microsoft.com/office/drawing/2014/main" xmlns="" id="{6836361F-EB9B-F2F9-8DB9-D767C8FACEA0}"/>
               </a:ext>
             </a:extLst>
           </p:cNvPr>
@@ -8086,7 +8087,7 @@
           <a:effectLst/>
           <a:extLst>
             <a:ext uri="{C572A759-6A51-4108-AA02-DFA0A04FC94B}">
-              <ma14:wrappingTextBoxFlag xmlns="" xmlns:m="http://schemas.openxmlformats.org/officeDocument/2006/math" xmlns:a14="http://schemas.microsoft.com/office/drawing/2010/main" xmlns:ma14="http://schemas.microsoft.com/office/mac/drawingml/2011/main" val="1"/>
+              <ma14:wrappingTextBoxFlag xmlns:ma14="http://schemas.microsoft.com/office/mac/drawingml/2011/main" xmlns:a14="http://schemas.microsoft.com/office/drawing/2010/main" xmlns:m="http://schemas.openxmlformats.org/officeDocument/2006/math" xmlns="" val="1"/>
             </a:ext>
           </a:extLst>
         </p:spPr>
@@ -8126,7 +8127,7 @@
           <p:cNvPr id="6" name="[a preencher]">
             <a:extLst>
               <a:ext uri="{FF2B5EF4-FFF2-40B4-BE49-F238E27FC236}">
-                <a16:creationId xmlns:a16="http://schemas.microsoft.com/office/drawing/2014/main" id="{C273C144-510F-65CB-583F-D3F55371AD52}"/>
+                <a16:creationId xmlns:a16="http://schemas.microsoft.com/office/drawing/2014/main" xmlns="" id="{C273C144-510F-65CB-583F-D3F55371AD52}"/>
               </a:ext>
             </a:extLst>
           </p:cNvPr>
@@ -8149,7 +8150,7 @@
           <a:effectLst/>
           <a:extLst>
             <a:ext uri="{C572A759-6A51-4108-AA02-DFA0A04FC94B}">
-              <ma14:wrappingTextBoxFlag xmlns="" xmlns:m="http://schemas.openxmlformats.org/officeDocument/2006/math" xmlns:a14="http://schemas.microsoft.com/office/drawing/2010/main" xmlns:ma14="http://schemas.microsoft.com/office/mac/drawingml/2011/main" val="1"/>
+              <ma14:wrappingTextBoxFlag xmlns:ma14="http://schemas.microsoft.com/office/mac/drawingml/2011/main" xmlns:a14="http://schemas.microsoft.com/office/drawing/2010/main" xmlns:m="http://schemas.openxmlformats.org/officeDocument/2006/math" xmlns="" val="1"/>
             </a:ext>
           </a:extLst>
         </p:spPr>
@@ -8198,6 +8199,101 @@
         </p:txBody>
       </p:sp>
     </p:spTree>
+  </p:cSld>
+  <p:clrMapOvr>
+    <a:masterClrMapping/>
+  </p:clrMapOvr>
+  <p:transition spd="med"/>
+</p:sld>
+</file>
+
+<file path=ppt/slides/slide13.xml><?xml version="1.0" encoding="utf-8"?>
+<p:sld xmlns:a="http://schemas.openxmlformats.org/drawingml/2006/main" xmlns:r="http://schemas.openxmlformats.org/officeDocument/2006/relationships" xmlns:p="http://schemas.openxmlformats.org/presentationml/2006/main">
+  <p:cSld>
+    <p:spTree>
+      <p:nvGrpSpPr>
+        <p:cNvPr id="1" name=""/>
+        <p:cNvGrpSpPr/>
+        <p:nvPr/>
+      </p:nvGrpSpPr>
+      <p:grpSpPr>
+        <a:xfrm>
+          <a:off x="0" y="0"/>
+          <a:ext cx="0" cy="0"/>
+          <a:chOff x="0" y="0"/>
+          <a:chExt cx="0" cy="0"/>
+        </a:xfrm>
+      </p:grpSpPr>
+      <p:sp>
+        <p:nvSpPr>
+          <p:cNvPr id="2" name="Espaço Reservado para Texto 1"/>
+          <p:cNvSpPr>
+            <a:spLocks noGrp="1"/>
+          </p:cNvSpPr>
+          <p:nvPr>
+            <p:ph type="body" sz="quarter" idx="21"/>
+          </p:nvPr>
+        </p:nvSpPr>
+        <p:spPr>
+          <a:xfrm>
+            <a:off x="6915617" y="6611365"/>
+            <a:ext cx="5159844" cy="319131"/>
+          </a:xfrm>
+        </p:spPr>
+        <p:txBody>
+          <a:bodyPr>
+            <a:normAutofit lnSpcReduction="10000"/>
+          </a:bodyPr>
+          <a:lstStyle/>
+          <a:p>
+            <a:r>
+              <a:rPr lang="pt-BR" dirty="0">
+                <a:hlinkClick r:id="rId2"/>
+              </a:rPr>
+              <a:t>https://github.com/lucasLmontes/projetoBeA</a:t>
+            </a:r>
+            <a:endParaRPr lang="pt-BR" dirty="0"/>
+          </a:p>
+        </p:txBody>
+      </p:sp>
+      <p:sp>
+        <p:nvSpPr>
+          <p:cNvPr id="4" name="Espaço Reservado para Texto 3"/>
+          <p:cNvSpPr>
+            <a:spLocks noGrp="1"/>
+          </p:cNvSpPr>
+          <p:nvPr>
+            <p:ph type="body" sz="quarter" idx="1"/>
+          </p:nvPr>
+        </p:nvSpPr>
+        <p:spPr>
+          <a:xfrm>
+            <a:off x="6915617" y="5622229"/>
+            <a:ext cx="11408020" cy="989136"/>
+          </a:xfrm>
+        </p:spPr>
+        <p:txBody>
+          <a:bodyPr/>
+          <a:lstStyle/>
+          <a:p>
+            <a:r>
+              <a:rPr lang="pt-BR" dirty="0" smtClean="0"/>
+              <a:t>Link de acesso para o </a:t>
+            </a:r>
+            <a:r>
+              <a:rPr lang="pt-BR" dirty="0" err="1" smtClean="0"/>
+              <a:t>git</a:t>
+            </a:r>
+            <a:endParaRPr lang="pt-BR" dirty="0"/>
+          </a:p>
+        </p:txBody>
+      </p:sp>
+    </p:spTree>
+    <p:extLst>
+      <p:ext uri="{BB962C8B-B14F-4D97-AF65-F5344CB8AC3E}">
+        <p14:creationId xmlns:p14="http://schemas.microsoft.com/office/powerpoint/2010/main" val="391122728"/>
+      </p:ext>
+    </p:extLst>
   </p:cSld>
   <p:clrMapOvr>
     <a:masterClrMapping/>
@@ -8282,7 +8378,7 @@
           </a:ln>
           <a:extLst>
             <a:ext uri="{C572A759-6A51-4108-AA02-DFA0A04FC94B}">
-              <ma14:wrappingTextBoxFlag xmlns="" xmlns:m="http://schemas.openxmlformats.org/officeDocument/2006/math" xmlns:a14="http://schemas.microsoft.com/office/drawing/2010/main" xmlns:ma14="http://schemas.microsoft.com/office/mac/drawingml/2011/main" val="1"/>
+              <ma14:wrappingTextBoxFlag xmlns:ma14="http://schemas.microsoft.com/office/mac/drawingml/2011/main" xmlns:a14="http://schemas.microsoft.com/office/drawing/2010/main" xmlns:m="http://schemas.openxmlformats.org/officeDocument/2006/math" xmlns="" val="1"/>
             </a:ext>
           </a:extLst>
         </p:spPr>
@@ -8373,7 +8469,7 @@
           </a:ln>
           <a:extLst>
             <a:ext uri="{C572A759-6A51-4108-AA02-DFA0A04FC94B}">
-              <ma14:wrappingTextBoxFlag xmlns="" xmlns:m="http://schemas.openxmlformats.org/officeDocument/2006/math" xmlns:a14="http://schemas.microsoft.com/office/drawing/2010/main" xmlns:ma14="http://schemas.microsoft.com/office/mac/drawingml/2011/main" val="1"/>
+              <ma14:wrappingTextBoxFlag xmlns:ma14="http://schemas.microsoft.com/office/mac/drawingml/2011/main" xmlns:a14="http://schemas.microsoft.com/office/drawing/2010/main" xmlns:m="http://schemas.openxmlformats.org/officeDocument/2006/math" xmlns="" val="1"/>
             </a:ext>
           </a:extLst>
         </p:spPr>
@@ -8504,7 +8600,7 @@
           </a:ln>
           <a:extLst>
             <a:ext uri="{C572A759-6A51-4108-AA02-DFA0A04FC94B}">
-              <ma14:wrappingTextBoxFlag xmlns="" xmlns:m="http://schemas.openxmlformats.org/officeDocument/2006/math" xmlns:a14="http://schemas.microsoft.com/office/drawing/2010/main" xmlns:ma14="http://schemas.microsoft.com/office/mac/drawingml/2011/main" val="1"/>
+              <ma14:wrappingTextBoxFlag xmlns:ma14="http://schemas.microsoft.com/office/mac/drawingml/2011/main" xmlns:a14="http://schemas.microsoft.com/office/drawing/2010/main" xmlns:m="http://schemas.openxmlformats.org/officeDocument/2006/math" xmlns="" val="1"/>
             </a:ext>
           </a:extLst>
         </p:spPr>
@@ -8555,7 +8651,7 @@
           </a:ln>
           <a:extLst>
             <a:ext uri="{C572A759-6A51-4108-AA02-DFA0A04FC94B}">
-              <ma14:wrappingTextBoxFlag xmlns="" xmlns:m="http://schemas.openxmlformats.org/officeDocument/2006/math" xmlns:a14="http://schemas.microsoft.com/office/drawing/2010/main" xmlns:ma14="http://schemas.microsoft.com/office/mac/drawingml/2011/main" val="1"/>
+              <ma14:wrappingTextBoxFlag xmlns:ma14="http://schemas.microsoft.com/office/mac/drawingml/2011/main" xmlns:a14="http://schemas.microsoft.com/office/drawing/2010/main" xmlns:m="http://schemas.openxmlformats.org/officeDocument/2006/math" xmlns="" val="1"/>
             </a:ext>
           </a:extLst>
         </p:spPr>
@@ -8602,7 +8698,7 @@
           </a:ln>
           <a:extLst>
             <a:ext uri="{C572A759-6A51-4108-AA02-DFA0A04FC94B}">
-              <ma14:wrappingTextBoxFlag xmlns="" xmlns:m="http://schemas.openxmlformats.org/officeDocument/2006/math" xmlns:a14="http://schemas.microsoft.com/office/drawing/2010/main" xmlns:ma14="http://schemas.microsoft.com/office/mac/drawingml/2011/main" val="1"/>
+              <ma14:wrappingTextBoxFlag xmlns:ma14="http://schemas.microsoft.com/office/mac/drawingml/2011/main" xmlns:a14="http://schemas.microsoft.com/office/drawing/2010/main" xmlns:m="http://schemas.openxmlformats.org/officeDocument/2006/math" xmlns="" val="1"/>
             </a:ext>
           </a:extLst>
         </p:spPr>
@@ -8649,7 +8745,7 @@
           </a:ln>
           <a:extLst>
             <a:ext uri="{C572A759-6A51-4108-AA02-DFA0A04FC94B}">
-              <ma14:wrappingTextBoxFlag xmlns="" xmlns:m="http://schemas.openxmlformats.org/officeDocument/2006/math" xmlns:a14="http://schemas.microsoft.com/office/drawing/2010/main" xmlns:ma14="http://schemas.microsoft.com/office/mac/drawingml/2011/main" val="1"/>
+              <ma14:wrappingTextBoxFlag xmlns:ma14="http://schemas.microsoft.com/office/mac/drawingml/2011/main" xmlns:a14="http://schemas.microsoft.com/office/drawing/2010/main" xmlns:m="http://schemas.openxmlformats.org/officeDocument/2006/math" xmlns="" val="1"/>
             </a:ext>
           </a:extLst>
         </p:spPr>
@@ -8817,7 +8913,7 @@
           </a:ln>
           <a:extLst>
             <a:ext uri="{C572A759-6A51-4108-AA02-DFA0A04FC94B}">
-              <ma14:wrappingTextBoxFlag xmlns="" xmlns:m="http://schemas.openxmlformats.org/officeDocument/2006/math" xmlns:a14="http://schemas.microsoft.com/office/drawing/2010/main" xmlns:ma14="http://schemas.microsoft.com/office/mac/drawingml/2011/main" val="1"/>
+              <ma14:wrappingTextBoxFlag xmlns:ma14="http://schemas.microsoft.com/office/mac/drawingml/2011/main" xmlns:a14="http://schemas.microsoft.com/office/drawing/2010/main" xmlns:m="http://schemas.openxmlformats.org/officeDocument/2006/math" xmlns="" val="1"/>
             </a:ext>
           </a:extLst>
         </p:spPr>
@@ -8864,7 +8960,7 @@
           </a:ln>
           <a:extLst>
             <a:ext uri="{C572A759-6A51-4108-AA02-DFA0A04FC94B}">
-              <ma14:wrappingTextBoxFlag xmlns="" xmlns:m="http://schemas.openxmlformats.org/officeDocument/2006/math" xmlns:a14="http://schemas.microsoft.com/office/drawing/2010/main" xmlns:ma14="http://schemas.microsoft.com/office/mac/drawingml/2011/main" val="1"/>
+              <ma14:wrappingTextBoxFlag xmlns:ma14="http://schemas.microsoft.com/office/mac/drawingml/2011/main" xmlns:a14="http://schemas.microsoft.com/office/drawing/2010/main" xmlns:m="http://schemas.openxmlformats.org/officeDocument/2006/math" xmlns="" val="1"/>
             </a:ext>
           </a:extLst>
         </p:spPr>
@@ -8954,7 +9050,7 @@
           </a:ln>
           <a:extLst>
             <a:ext uri="{C572A759-6A51-4108-AA02-DFA0A04FC94B}">
-              <ma14:wrappingTextBoxFlag xmlns="" xmlns:m="http://schemas.openxmlformats.org/officeDocument/2006/math" xmlns:a14="http://schemas.microsoft.com/office/drawing/2010/main" xmlns:ma14="http://schemas.microsoft.com/office/mac/drawingml/2011/main" val="1"/>
+              <ma14:wrappingTextBoxFlag xmlns:ma14="http://schemas.microsoft.com/office/mac/drawingml/2011/main" xmlns:a14="http://schemas.microsoft.com/office/drawing/2010/main" xmlns:m="http://schemas.openxmlformats.org/officeDocument/2006/math" xmlns="" val="1"/>
             </a:ext>
           </a:extLst>
         </p:spPr>
@@ -9041,7 +9137,7 @@
           </a:ln>
           <a:extLst>
             <a:ext uri="{C572A759-6A51-4108-AA02-DFA0A04FC94B}">
-              <ma14:wrappingTextBoxFlag xmlns="" xmlns:m="http://schemas.openxmlformats.org/officeDocument/2006/math" xmlns:a14="http://schemas.microsoft.com/office/drawing/2010/main" xmlns:ma14="http://schemas.microsoft.com/office/mac/drawingml/2011/main" val="1"/>
+              <ma14:wrappingTextBoxFlag xmlns:ma14="http://schemas.microsoft.com/office/mac/drawingml/2011/main" xmlns:a14="http://schemas.microsoft.com/office/drawing/2010/main" xmlns:m="http://schemas.openxmlformats.org/officeDocument/2006/math" xmlns="" val="1"/>
             </a:ext>
           </a:extLst>
         </p:spPr>
@@ -9128,7 +9224,7 @@
           </a:ln>
           <a:extLst>
             <a:ext uri="{C572A759-6A51-4108-AA02-DFA0A04FC94B}">
-              <ma14:wrappingTextBoxFlag xmlns="" xmlns:m="http://schemas.openxmlformats.org/officeDocument/2006/math" xmlns:a14="http://schemas.microsoft.com/office/drawing/2010/main" xmlns:ma14="http://schemas.microsoft.com/office/mac/drawingml/2011/main" val="1"/>
+              <ma14:wrappingTextBoxFlag xmlns:ma14="http://schemas.microsoft.com/office/mac/drawingml/2011/main" xmlns:a14="http://schemas.microsoft.com/office/drawing/2010/main" xmlns:m="http://schemas.openxmlformats.org/officeDocument/2006/math" xmlns="" val="1"/>
             </a:ext>
           </a:extLst>
         </p:spPr>
@@ -9175,7 +9271,7 @@
           </a:ln>
           <a:extLst>
             <a:ext uri="{C572A759-6A51-4108-AA02-DFA0A04FC94B}">
-              <ma14:wrappingTextBoxFlag xmlns="" xmlns:m="http://schemas.openxmlformats.org/officeDocument/2006/math" xmlns:a14="http://schemas.microsoft.com/office/drawing/2010/main" xmlns:ma14="http://schemas.microsoft.com/office/mac/drawingml/2011/main" val="1"/>
+              <ma14:wrappingTextBoxFlag xmlns:ma14="http://schemas.microsoft.com/office/mac/drawingml/2011/main" xmlns:a14="http://schemas.microsoft.com/office/drawing/2010/main" xmlns:m="http://schemas.openxmlformats.org/officeDocument/2006/math" xmlns="" val="1"/>
             </a:ext>
           </a:extLst>
         </p:spPr>
@@ -9222,7 +9318,7 @@
           </a:ln>
           <a:extLst>
             <a:ext uri="{C572A759-6A51-4108-AA02-DFA0A04FC94B}">
-              <ma14:wrappingTextBoxFlag xmlns="" xmlns:m="http://schemas.openxmlformats.org/officeDocument/2006/math" xmlns:a14="http://schemas.microsoft.com/office/drawing/2010/main" xmlns:ma14="http://schemas.microsoft.com/office/mac/drawingml/2011/main" val="1"/>
+              <ma14:wrappingTextBoxFlag xmlns:ma14="http://schemas.microsoft.com/office/mac/drawingml/2011/main" xmlns:a14="http://schemas.microsoft.com/office/drawing/2010/main" xmlns:m="http://schemas.openxmlformats.org/officeDocument/2006/math" xmlns="" val="1"/>
             </a:ext>
           </a:extLst>
         </p:spPr>
@@ -9349,7 +9445,7 @@
           </a:ln>
           <a:extLst>
             <a:ext uri="{C572A759-6A51-4108-AA02-DFA0A04FC94B}">
-              <ma14:wrappingTextBoxFlag xmlns="" xmlns:m="http://schemas.openxmlformats.org/officeDocument/2006/math" xmlns:a14="http://schemas.microsoft.com/office/drawing/2010/main" xmlns:ma14="http://schemas.microsoft.com/office/mac/drawingml/2011/main" val="1"/>
+              <ma14:wrappingTextBoxFlag xmlns:ma14="http://schemas.microsoft.com/office/mac/drawingml/2011/main" xmlns:a14="http://schemas.microsoft.com/office/drawing/2010/main" xmlns:m="http://schemas.openxmlformats.org/officeDocument/2006/math" xmlns="" val="1"/>
             </a:ext>
           </a:extLst>
         </p:spPr>
@@ -9436,7 +9532,7 @@
           </a:ln>
           <a:extLst>
             <a:ext uri="{C572A759-6A51-4108-AA02-DFA0A04FC94B}">
-              <ma14:wrappingTextBoxFlag xmlns="" xmlns:m="http://schemas.openxmlformats.org/officeDocument/2006/math" xmlns:a14="http://schemas.microsoft.com/office/drawing/2010/main" xmlns:ma14="http://schemas.microsoft.com/office/mac/drawingml/2011/main" val="1"/>
+              <ma14:wrappingTextBoxFlag xmlns:ma14="http://schemas.microsoft.com/office/mac/drawingml/2011/main" xmlns:a14="http://schemas.microsoft.com/office/drawing/2010/main" xmlns:m="http://schemas.openxmlformats.org/officeDocument/2006/math" xmlns="" val="1"/>
             </a:ext>
           </a:extLst>
         </p:spPr>
@@ -9523,7 +9619,7 @@
           </a:ln>
           <a:extLst>
             <a:ext uri="{C572A759-6A51-4108-AA02-DFA0A04FC94B}">
-              <ma14:wrappingTextBoxFlag xmlns="" xmlns:m="http://schemas.openxmlformats.org/officeDocument/2006/math" xmlns:a14="http://schemas.microsoft.com/office/drawing/2010/main" xmlns:ma14="http://schemas.microsoft.com/office/mac/drawingml/2011/main" val="1"/>
+              <ma14:wrappingTextBoxFlag xmlns:ma14="http://schemas.microsoft.com/office/mac/drawingml/2011/main" xmlns:a14="http://schemas.microsoft.com/office/drawing/2010/main" xmlns:m="http://schemas.openxmlformats.org/officeDocument/2006/math" xmlns="" val="1"/>
             </a:ext>
           </a:extLst>
         </p:spPr>
@@ -9625,7 +9721,7 @@
           </a:ln>
           <a:extLst>
             <a:ext uri="{C572A759-6A51-4108-AA02-DFA0A04FC94B}">
-              <ma14:wrappingTextBoxFlag xmlns="" xmlns:m="http://schemas.openxmlformats.org/officeDocument/2006/math" xmlns:a14="http://schemas.microsoft.com/office/drawing/2010/main" xmlns:ma14="http://schemas.microsoft.com/office/mac/drawingml/2011/main" val="1"/>
+              <ma14:wrappingTextBoxFlag xmlns:ma14="http://schemas.microsoft.com/office/mac/drawingml/2011/main" xmlns:a14="http://schemas.microsoft.com/office/drawing/2010/main" xmlns:m="http://schemas.openxmlformats.org/officeDocument/2006/math" xmlns="" val="1"/>
             </a:ext>
           </a:extLst>
         </p:spPr>
@@ -9672,7 +9768,7 @@
           </a:ln>
           <a:extLst>
             <a:ext uri="{C572A759-6A51-4108-AA02-DFA0A04FC94B}">
-              <ma14:wrappingTextBoxFlag xmlns="" xmlns:m="http://schemas.openxmlformats.org/officeDocument/2006/math" xmlns:a14="http://schemas.microsoft.com/office/drawing/2010/main" xmlns:ma14="http://schemas.microsoft.com/office/mac/drawingml/2011/main" val="1"/>
+              <ma14:wrappingTextBoxFlag xmlns:ma14="http://schemas.microsoft.com/office/mac/drawingml/2011/main" xmlns:a14="http://schemas.microsoft.com/office/drawing/2010/main" xmlns:m="http://schemas.openxmlformats.org/officeDocument/2006/math" xmlns="" val="1"/>
             </a:ext>
           </a:extLst>
         </p:spPr>
@@ -9723,7 +9819,7 @@
           </a:ln>
           <a:extLst>
             <a:ext uri="{C572A759-6A51-4108-AA02-DFA0A04FC94B}">
-              <ma14:wrappingTextBoxFlag xmlns="" xmlns:m="http://schemas.openxmlformats.org/officeDocument/2006/math" xmlns:a14="http://schemas.microsoft.com/office/drawing/2010/main" xmlns:ma14="http://schemas.microsoft.com/office/mac/drawingml/2011/main" val="1"/>
+              <ma14:wrappingTextBoxFlag xmlns:ma14="http://schemas.microsoft.com/office/mac/drawingml/2011/main" xmlns:a14="http://schemas.microsoft.com/office/drawing/2010/main" xmlns:m="http://schemas.openxmlformats.org/officeDocument/2006/math" xmlns="" val="1"/>
             </a:ext>
           </a:extLst>
         </p:spPr>
@@ -9770,7 +9866,7 @@
           </a:ln>
           <a:extLst>
             <a:ext uri="{C572A759-6A51-4108-AA02-DFA0A04FC94B}">
-              <ma14:wrappingTextBoxFlag xmlns="" xmlns:m="http://schemas.openxmlformats.org/officeDocument/2006/math" xmlns:a14="http://schemas.microsoft.com/office/drawing/2010/main" xmlns:ma14="http://schemas.microsoft.com/office/mac/drawingml/2011/main" val="1"/>
+              <ma14:wrappingTextBoxFlag xmlns:ma14="http://schemas.microsoft.com/office/mac/drawingml/2011/main" xmlns:a14="http://schemas.microsoft.com/office/drawing/2010/main" xmlns:m="http://schemas.openxmlformats.org/officeDocument/2006/math" xmlns="" val="1"/>
             </a:ext>
           </a:extLst>
         </p:spPr>
@@ -9897,7 +9993,7 @@
           </a:ln>
           <a:extLst>
             <a:ext uri="{C572A759-6A51-4108-AA02-DFA0A04FC94B}">
-              <ma14:wrappingTextBoxFlag xmlns="" xmlns:m="http://schemas.openxmlformats.org/officeDocument/2006/math" xmlns:a14="http://schemas.microsoft.com/office/drawing/2010/main" xmlns:ma14="http://schemas.microsoft.com/office/mac/drawingml/2011/main" val="1"/>
+              <ma14:wrappingTextBoxFlag xmlns:ma14="http://schemas.microsoft.com/office/mac/drawingml/2011/main" xmlns:a14="http://schemas.microsoft.com/office/drawing/2010/main" xmlns:m="http://schemas.openxmlformats.org/officeDocument/2006/math" xmlns="" val="1"/>
             </a:ext>
           </a:extLst>
         </p:spPr>
@@ -9984,7 +10080,7 @@
           </a:ln>
           <a:extLst>
             <a:ext uri="{C572A759-6A51-4108-AA02-DFA0A04FC94B}">
-              <ma14:wrappingTextBoxFlag xmlns="" xmlns:m="http://schemas.openxmlformats.org/officeDocument/2006/math" xmlns:a14="http://schemas.microsoft.com/office/drawing/2010/main" xmlns:ma14="http://schemas.microsoft.com/office/mac/drawingml/2011/main" val="1"/>
+              <ma14:wrappingTextBoxFlag xmlns:ma14="http://schemas.microsoft.com/office/mac/drawingml/2011/main" xmlns:a14="http://schemas.microsoft.com/office/drawing/2010/main" xmlns:m="http://schemas.openxmlformats.org/officeDocument/2006/math" xmlns="" val="1"/>
             </a:ext>
           </a:extLst>
         </p:spPr>
@@ -10071,7 +10167,7 @@
           </a:ln>
           <a:extLst>
             <a:ext uri="{C572A759-6A51-4108-AA02-DFA0A04FC94B}">
-              <ma14:wrappingTextBoxFlag xmlns="" xmlns:m="http://schemas.openxmlformats.org/officeDocument/2006/math" xmlns:a14="http://schemas.microsoft.com/office/drawing/2010/main" xmlns:ma14="http://schemas.microsoft.com/office/mac/drawingml/2011/main" val="1"/>
+              <ma14:wrappingTextBoxFlag xmlns:ma14="http://schemas.microsoft.com/office/mac/drawingml/2011/main" xmlns:a14="http://schemas.microsoft.com/office/drawing/2010/main" xmlns:m="http://schemas.openxmlformats.org/officeDocument/2006/math" xmlns="" val="1"/>
             </a:ext>
           </a:extLst>
         </p:spPr>
@@ -10158,7 +10254,7 @@
           </a:ln>
           <a:extLst>
             <a:ext uri="{C572A759-6A51-4108-AA02-DFA0A04FC94B}">
-              <ma14:wrappingTextBoxFlag xmlns="" xmlns:m="http://schemas.openxmlformats.org/officeDocument/2006/math" xmlns:a14="http://schemas.microsoft.com/office/drawing/2010/main" xmlns:ma14="http://schemas.microsoft.com/office/mac/drawingml/2011/main" val="1"/>
+              <ma14:wrappingTextBoxFlag xmlns:ma14="http://schemas.microsoft.com/office/mac/drawingml/2011/main" xmlns:a14="http://schemas.microsoft.com/office/drawing/2010/main" xmlns:m="http://schemas.openxmlformats.org/officeDocument/2006/math" xmlns="" val="1"/>
             </a:ext>
           </a:extLst>
         </p:spPr>
@@ -10205,7 +10301,7 @@
           </a:ln>
           <a:extLst>
             <a:ext uri="{C572A759-6A51-4108-AA02-DFA0A04FC94B}">
-              <ma14:wrappingTextBoxFlag xmlns="" xmlns:m="http://schemas.openxmlformats.org/officeDocument/2006/math" xmlns:a14="http://schemas.microsoft.com/office/drawing/2010/main" xmlns:ma14="http://schemas.microsoft.com/office/mac/drawingml/2011/main" val="1"/>
+              <ma14:wrappingTextBoxFlag xmlns:ma14="http://schemas.microsoft.com/office/mac/drawingml/2011/main" xmlns:a14="http://schemas.microsoft.com/office/drawing/2010/main" xmlns:m="http://schemas.openxmlformats.org/officeDocument/2006/math" xmlns="" val="1"/>
             </a:ext>
           </a:extLst>
         </p:spPr>
@@ -10289,7 +10385,7 @@
           </a:ln>
           <a:extLst>
             <a:ext uri="{C572A759-6A51-4108-AA02-DFA0A04FC94B}">
-              <ma14:wrappingTextBoxFlag xmlns="" xmlns:m="http://schemas.openxmlformats.org/officeDocument/2006/math" xmlns:a14="http://schemas.microsoft.com/office/drawing/2010/main" xmlns:ma14="http://schemas.microsoft.com/office/mac/drawingml/2011/main" val="1"/>
+              <ma14:wrappingTextBoxFlag xmlns:ma14="http://schemas.microsoft.com/office/mac/drawingml/2011/main" xmlns:a14="http://schemas.microsoft.com/office/drawing/2010/main" xmlns:m="http://schemas.openxmlformats.org/officeDocument/2006/math" xmlns="" val="1"/>
             </a:ext>
           </a:extLst>
         </p:spPr>
@@ -10441,7 +10537,7 @@
           </a:ln>
           <a:extLst>
             <a:ext uri="{C572A759-6A51-4108-AA02-DFA0A04FC94B}">
-              <ma14:wrappingTextBoxFlag xmlns="" xmlns:m="http://schemas.openxmlformats.org/officeDocument/2006/math" xmlns:a14="http://schemas.microsoft.com/office/drawing/2010/main" xmlns:ma14="http://schemas.microsoft.com/office/mac/drawingml/2011/main" val="1"/>
+              <ma14:wrappingTextBoxFlag xmlns:ma14="http://schemas.microsoft.com/office/mac/drawingml/2011/main" xmlns:a14="http://schemas.microsoft.com/office/drawing/2010/main" xmlns:m="http://schemas.openxmlformats.org/officeDocument/2006/math" xmlns="" val="1"/>
             </a:ext>
           </a:extLst>
         </p:spPr>
@@ -10580,7 +10676,7 @@
                 <a:effectLst/>
                 <a:extLst>
                   <a:ext uri="{C572A759-6A51-4108-AA02-DFA0A04FC94B}">
-                    <ma14:wrappingTextBoxFlag xmlns="" xmlns:m="http://schemas.openxmlformats.org/officeDocument/2006/math" xmlns:a14="http://schemas.microsoft.com/office/drawing/2010/main" xmlns:ma14="http://schemas.microsoft.com/office/mac/drawingml/2011/main" val="1"/>
+                    <ma14:wrappingTextBoxFlag xmlns:ma14="http://schemas.microsoft.com/office/mac/drawingml/2011/main" xmlns:a14="http://schemas.microsoft.com/office/drawing/2010/main" xmlns:m="http://schemas.openxmlformats.org/officeDocument/2006/math" xmlns="" val="1"/>
                   </a:ext>
                 </a:extLst>
               </p:spPr>
@@ -10632,7 +10728,7 @@
               <a:effectLst/>
               <a:extLst>
                 <a:ext uri="{C572A759-6A51-4108-AA02-DFA0A04FC94B}">
-                  <ma14:wrappingTextBoxFlag xmlns="" xmlns:m="http://schemas.openxmlformats.org/officeDocument/2006/math" xmlns:a14="http://schemas.microsoft.com/office/drawing/2010/main" xmlns:ma14="http://schemas.microsoft.com/office/mac/drawingml/2011/main" val="1"/>
+                  <ma14:wrappingTextBoxFlag xmlns:ma14="http://schemas.microsoft.com/office/mac/drawingml/2011/main" xmlns:a14="http://schemas.microsoft.com/office/drawing/2010/main" xmlns:m="http://schemas.openxmlformats.org/officeDocument/2006/math" xmlns="" val="1"/>
                 </a:ext>
               </a:extLst>
             </p:spPr>
@@ -10841,7 +10937,7 @@
                 <a:effectLst/>
                 <a:extLst>
                   <a:ext uri="{C572A759-6A51-4108-AA02-DFA0A04FC94B}">
-                    <ma14:wrappingTextBoxFlag xmlns="" xmlns:m="http://schemas.openxmlformats.org/officeDocument/2006/math" xmlns:a14="http://schemas.microsoft.com/office/drawing/2010/main" xmlns:ma14="http://schemas.microsoft.com/office/mac/drawingml/2011/main" val="1"/>
+                    <ma14:wrappingTextBoxFlag xmlns:ma14="http://schemas.microsoft.com/office/mac/drawingml/2011/main" xmlns:a14="http://schemas.microsoft.com/office/drawing/2010/main" xmlns:m="http://schemas.openxmlformats.org/officeDocument/2006/math" xmlns="" val="1"/>
                   </a:ext>
                 </a:extLst>
               </p:spPr>
@@ -10892,7 +10988,7 @@
               <a:effectLst/>
               <a:extLst>
                 <a:ext uri="{C572A759-6A51-4108-AA02-DFA0A04FC94B}">
-                  <ma14:wrappingTextBoxFlag xmlns="" xmlns:m="http://schemas.openxmlformats.org/officeDocument/2006/math" xmlns:a14="http://schemas.microsoft.com/office/drawing/2010/main" xmlns:ma14="http://schemas.microsoft.com/office/mac/drawingml/2011/main" val="1"/>
+                  <ma14:wrappingTextBoxFlag xmlns:ma14="http://schemas.microsoft.com/office/mac/drawingml/2011/main" xmlns:a14="http://schemas.microsoft.com/office/drawing/2010/main" xmlns:m="http://schemas.openxmlformats.org/officeDocument/2006/math" xmlns="" val="1"/>
                 </a:ext>
               </a:extLst>
             </p:spPr>
@@ -11138,7 +11234,7 @@
                 <a:effectLst/>
                 <a:extLst>
                   <a:ext uri="{C572A759-6A51-4108-AA02-DFA0A04FC94B}">
-                    <ma14:wrappingTextBoxFlag xmlns="" xmlns:m="http://schemas.openxmlformats.org/officeDocument/2006/math" xmlns:a14="http://schemas.microsoft.com/office/drawing/2010/main" xmlns:ma14="http://schemas.microsoft.com/office/mac/drawingml/2011/main" val="1"/>
+                    <ma14:wrappingTextBoxFlag xmlns:ma14="http://schemas.microsoft.com/office/mac/drawingml/2011/main" xmlns:a14="http://schemas.microsoft.com/office/drawing/2010/main" xmlns:m="http://schemas.openxmlformats.org/officeDocument/2006/math" xmlns="" val="1"/>
                   </a:ext>
                 </a:extLst>
               </p:spPr>
@@ -11189,7 +11285,7 @@
               <a:effectLst/>
               <a:extLst>
                 <a:ext uri="{C572A759-6A51-4108-AA02-DFA0A04FC94B}">
-                  <ma14:wrappingTextBoxFlag xmlns="" xmlns:m="http://schemas.openxmlformats.org/officeDocument/2006/math" xmlns:a14="http://schemas.microsoft.com/office/drawing/2010/main" xmlns:ma14="http://schemas.microsoft.com/office/mac/drawingml/2011/main" val="1"/>
+                  <ma14:wrappingTextBoxFlag xmlns:ma14="http://schemas.microsoft.com/office/mac/drawingml/2011/main" xmlns:a14="http://schemas.microsoft.com/office/drawing/2010/main" xmlns:m="http://schemas.openxmlformats.org/officeDocument/2006/math" xmlns="" val="1"/>
                 </a:ext>
               </a:extLst>
             </p:spPr>
@@ -11314,7 +11410,7 @@
                 <a:effectLst/>
                 <a:extLst>
                   <a:ext uri="{C572A759-6A51-4108-AA02-DFA0A04FC94B}">
-                    <ma14:wrappingTextBoxFlag xmlns="" xmlns:m="http://schemas.openxmlformats.org/officeDocument/2006/math" xmlns:a14="http://schemas.microsoft.com/office/drawing/2010/main" xmlns:ma14="http://schemas.microsoft.com/office/mac/drawingml/2011/main" val="1"/>
+                    <ma14:wrappingTextBoxFlag xmlns:ma14="http://schemas.microsoft.com/office/mac/drawingml/2011/main" xmlns:a14="http://schemas.microsoft.com/office/drawing/2010/main" xmlns:m="http://schemas.openxmlformats.org/officeDocument/2006/math" xmlns="" val="1"/>
                   </a:ext>
                 </a:extLst>
               </p:spPr>
@@ -11365,7 +11461,7 @@
               <a:effectLst/>
               <a:extLst>
                 <a:ext uri="{C572A759-6A51-4108-AA02-DFA0A04FC94B}">
-                  <ma14:wrappingTextBoxFlag xmlns="" xmlns:m="http://schemas.openxmlformats.org/officeDocument/2006/math" xmlns:a14="http://schemas.microsoft.com/office/drawing/2010/main" xmlns:ma14="http://schemas.microsoft.com/office/mac/drawingml/2011/main" val="1"/>
+                  <ma14:wrappingTextBoxFlag xmlns:ma14="http://schemas.microsoft.com/office/mac/drawingml/2011/main" xmlns:a14="http://schemas.microsoft.com/office/drawing/2010/main" xmlns:m="http://schemas.openxmlformats.org/officeDocument/2006/math" xmlns="" val="1"/>
                 </a:ext>
               </a:extLst>
             </p:spPr>
@@ -11490,7 +11586,7 @@
                 <a:effectLst/>
                 <a:extLst>
                   <a:ext uri="{C572A759-6A51-4108-AA02-DFA0A04FC94B}">
-                    <ma14:wrappingTextBoxFlag xmlns="" xmlns:m="http://schemas.openxmlformats.org/officeDocument/2006/math" xmlns:a14="http://schemas.microsoft.com/office/drawing/2010/main" xmlns:ma14="http://schemas.microsoft.com/office/mac/drawingml/2011/main" val="1"/>
+                    <ma14:wrappingTextBoxFlag xmlns:ma14="http://schemas.microsoft.com/office/mac/drawingml/2011/main" xmlns:a14="http://schemas.microsoft.com/office/drawing/2010/main" xmlns:m="http://schemas.openxmlformats.org/officeDocument/2006/math" xmlns="" val="1"/>
                   </a:ext>
                 </a:extLst>
               </p:spPr>
@@ -11542,7 +11638,7 @@
               <a:effectLst/>
               <a:extLst>
                 <a:ext uri="{C572A759-6A51-4108-AA02-DFA0A04FC94B}">
-                  <ma14:wrappingTextBoxFlag xmlns="" xmlns:m="http://schemas.openxmlformats.org/officeDocument/2006/math" xmlns:a14="http://schemas.microsoft.com/office/drawing/2010/main" xmlns:ma14="http://schemas.microsoft.com/office/mac/drawingml/2011/main" val="1"/>
+                  <ma14:wrappingTextBoxFlag xmlns:ma14="http://schemas.microsoft.com/office/mac/drawingml/2011/main" xmlns:a14="http://schemas.microsoft.com/office/drawing/2010/main" xmlns:m="http://schemas.openxmlformats.org/officeDocument/2006/math" xmlns="" val="1"/>
                 </a:ext>
               </a:extLst>
             </p:spPr>
@@ -11759,7 +11855,7 @@
                 <a:effectLst/>
                 <a:extLst>
                   <a:ext uri="{C572A759-6A51-4108-AA02-DFA0A04FC94B}">
-                    <ma14:wrappingTextBoxFlag xmlns="" xmlns:m="http://schemas.openxmlformats.org/officeDocument/2006/math" xmlns:a14="http://schemas.microsoft.com/office/drawing/2010/main" xmlns:ma14="http://schemas.microsoft.com/office/mac/drawingml/2011/main" val="1"/>
+                    <ma14:wrappingTextBoxFlag xmlns:ma14="http://schemas.microsoft.com/office/mac/drawingml/2011/main" xmlns:a14="http://schemas.microsoft.com/office/drawing/2010/main" xmlns:m="http://schemas.openxmlformats.org/officeDocument/2006/math" xmlns="" val="1"/>
                   </a:ext>
                 </a:extLst>
               </p:spPr>
@@ -11812,7 +11908,7 @@
               <a:effectLst/>
               <a:extLst>
                 <a:ext uri="{C572A759-6A51-4108-AA02-DFA0A04FC94B}">
-                  <ma14:wrappingTextBoxFlag xmlns="" xmlns:m="http://schemas.openxmlformats.org/officeDocument/2006/math" xmlns:a14="http://schemas.microsoft.com/office/drawing/2010/main" xmlns:ma14="http://schemas.microsoft.com/office/mac/drawingml/2011/main" val="1"/>
+                  <ma14:wrappingTextBoxFlag xmlns:ma14="http://schemas.microsoft.com/office/mac/drawingml/2011/main" xmlns:a14="http://schemas.microsoft.com/office/drawing/2010/main" xmlns:m="http://schemas.openxmlformats.org/officeDocument/2006/math" xmlns="" val="1"/>
                 </a:ext>
               </a:extLst>
             </p:spPr>
@@ -12042,7 +12138,7 @@
                 <a:effectLst/>
                 <a:extLst>
                   <a:ext uri="{C572A759-6A51-4108-AA02-DFA0A04FC94B}">
-                    <ma14:wrappingTextBoxFlag xmlns="" xmlns:m="http://schemas.openxmlformats.org/officeDocument/2006/math" xmlns:a14="http://schemas.microsoft.com/office/drawing/2010/main" xmlns:ma14="http://schemas.microsoft.com/office/mac/drawingml/2011/main" val="1"/>
+                    <ma14:wrappingTextBoxFlag xmlns:ma14="http://schemas.microsoft.com/office/mac/drawingml/2011/main" xmlns:a14="http://schemas.microsoft.com/office/drawing/2010/main" xmlns:m="http://schemas.openxmlformats.org/officeDocument/2006/math" xmlns="" val="1"/>
                   </a:ext>
                 </a:extLst>
               </p:spPr>
@@ -12095,7 +12191,7 @@
               <a:effectLst/>
               <a:extLst>
                 <a:ext uri="{C572A759-6A51-4108-AA02-DFA0A04FC94B}">
-                  <ma14:wrappingTextBoxFlag xmlns="" xmlns:m="http://schemas.openxmlformats.org/officeDocument/2006/math" xmlns:a14="http://schemas.microsoft.com/office/drawing/2010/main" xmlns:ma14="http://schemas.microsoft.com/office/mac/drawingml/2011/main" val="1"/>
+                  <ma14:wrappingTextBoxFlag xmlns:ma14="http://schemas.microsoft.com/office/mac/drawingml/2011/main" xmlns:a14="http://schemas.microsoft.com/office/drawing/2010/main" xmlns:m="http://schemas.openxmlformats.org/officeDocument/2006/math" xmlns="" val="1"/>
                 </a:ext>
               </a:extLst>
             </p:spPr>
@@ -12241,7 +12337,7 @@
           <a:effectLst/>
           <a:extLst>
             <a:ext uri="{C572A759-6A51-4108-AA02-DFA0A04FC94B}">
-              <ma14:wrappingTextBoxFlag xmlns="" xmlns:m="http://schemas.openxmlformats.org/officeDocument/2006/math" xmlns:a14="http://schemas.microsoft.com/office/drawing/2010/main" xmlns:ma14="http://schemas.microsoft.com/office/mac/drawingml/2011/main" val="1"/>
+              <ma14:wrappingTextBoxFlag xmlns:ma14="http://schemas.microsoft.com/office/mac/drawingml/2011/main" xmlns:a14="http://schemas.microsoft.com/office/drawing/2010/main" xmlns:m="http://schemas.openxmlformats.org/officeDocument/2006/math" xmlns="" val="1"/>
             </a:ext>
           </a:extLst>
         </p:spPr>
@@ -12293,7 +12389,7 @@
           <a:effectLst/>
           <a:extLst>
             <a:ext uri="{C572A759-6A51-4108-AA02-DFA0A04FC94B}">
-              <ma14:wrappingTextBoxFlag xmlns="" xmlns:m="http://schemas.openxmlformats.org/officeDocument/2006/math" xmlns:a14="http://schemas.microsoft.com/office/drawing/2010/main" xmlns:ma14="http://schemas.microsoft.com/office/mac/drawingml/2011/main" val="1"/>
+              <ma14:wrappingTextBoxFlag xmlns:ma14="http://schemas.microsoft.com/office/mac/drawingml/2011/main" xmlns:a14="http://schemas.microsoft.com/office/drawing/2010/main" xmlns:m="http://schemas.openxmlformats.org/officeDocument/2006/math" xmlns="" val="1"/>
             </a:ext>
           </a:extLst>
         </p:spPr>
@@ -12387,7 +12483,7 @@
           <a:effectLst/>
           <a:extLst>
             <a:ext uri="{C572A759-6A51-4108-AA02-DFA0A04FC94B}">
-              <ma14:wrappingTextBoxFlag xmlns="" xmlns:m="http://schemas.openxmlformats.org/officeDocument/2006/math" xmlns:a14="http://schemas.microsoft.com/office/drawing/2010/main" xmlns:ma14="http://schemas.microsoft.com/office/mac/drawingml/2011/main" val="1"/>
+              <ma14:wrappingTextBoxFlag xmlns:ma14="http://schemas.microsoft.com/office/mac/drawingml/2011/main" xmlns:a14="http://schemas.microsoft.com/office/drawing/2010/main" xmlns:m="http://schemas.openxmlformats.org/officeDocument/2006/math" xmlns="" val="1"/>
             </a:ext>
           </a:extLst>
         </p:spPr>
@@ -12439,7 +12535,7 @@
           <a:effectLst/>
           <a:extLst>
             <a:ext uri="{C572A759-6A51-4108-AA02-DFA0A04FC94B}">
-              <ma14:wrappingTextBoxFlag xmlns="" xmlns:m="http://schemas.openxmlformats.org/officeDocument/2006/math" xmlns:a14="http://schemas.microsoft.com/office/drawing/2010/main" xmlns:ma14="http://schemas.microsoft.com/office/mac/drawingml/2011/main" val="1"/>
+              <ma14:wrappingTextBoxFlag xmlns:ma14="http://schemas.microsoft.com/office/mac/drawingml/2011/main" xmlns:a14="http://schemas.microsoft.com/office/drawing/2010/main" xmlns:m="http://schemas.openxmlformats.org/officeDocument/2006/math" xmlns="" val="1"/>
             </a:ext>
           </a:extLst>
         </p:spPr>
@@ -12605,7 +12701,7 @@
                 <a:effectLst/>
                 <a:extLst>
                   <a:ext uri="{C572A759-6A51-4108-AA02-DFA0A04FC94B}">
-                    <ma14:wrappingTextBoxFlag xmlns="" xmlns:m="http://schemas.openxmlformats.org/officeDocument/2006/math" xmlns:a14="http://schemas.microsoft.com/office/drawing/2010/main" xmlns:ma14="http://schemas.microsoft.com/office/mac/drawingml/2011/main" val="1"/>
+                    <ma14:wrappingTextBoxFlag xmlns:ma14="http://schemas.microsoft.com/office/mac/drawingml/2011/main" xmlns:a14="http://schemas.microsoft.com/office/drawing/2010/main" xmlns:m="http://schemas.openxmlformats.org/officeDocument/2006/math" xmlns="" val="1"/>
                   </a:ext>
                 </a:extLst>
               </p:spPr>
@@ -12658,7 +12754,7 @@
               <a:effectLst/>
               <a:extLst>
                 <a:ext uri="{C572A759-6A51-4108-AA02-DFA0A04FC94B}">
-                  <ma14:wrappingTextBoxFlag xmlns="" xmlns:m="http://schemas.openxmlformats.org/officeDocument/2006/math" xmlns:a14="http://schemas.microsoft.com/office/drawing/2010/main" xmlns:ma14="http://schemas.microsoft.com/office/mac/drawingml/2011/main" val="1"/>
+                  <ma14:wrappingTextBoxFlag xmlns:ma14="http://schemas.microsoft.com/office/mac/drawingml/2011/main" xmlns:a14="http://schemas.microsoft.com/office/drawing/2010/main" xmlns:m="http://schemas.openxmlformats.org/officeDocument/2006/math" xmlns="" val="1"/>
                 </a:ext>
               </a:extLst>
             </p:spPr>
@@ -12783,7 +12879,7 @@
                 <a:effectLst/>
                 <a:extLst>
                   <a:ext uri="{C572A759-6A51-4108-AA02-DFA0A04FC94B}">
-                    <ma14:wrappingTextBoxFlag xmlns="" xmlns:m="http://schemas.openxmlformats.org/officeDocument/2006/math" xmlns:a14="http://schemas.microsoft.com/office/drawing/2010/main" xmlns:ma14="http://schemas.microsoft.com/office/mac/drawingml/2011/main" val="1"/>
+                    <ma14:wrappingTextBoxFlag xmlns:ma14="http://schemas.microsoft.com/office/mac/drawingml/2011/main" xmlns:a14="http://schemas.microsoft.com/office/drawing/2010/main" xmlns:m="http://schemas.openxmlformats.org/officeDocument/2006/math" xmlns="" val="1"/>
                   </a:ext>
                 </a:extLst>
               </p:spPr>
@@ -12836,7 +12932,7 @@
               <a:effectLst/>
               <a:extLst>
                 <a:ext uri="{C572A759-6A51-4108-AA02-DFA0A04FC94B}">
-                  <ma14:wrappingTextBoxFlag xmlns="" xmlns:m="http://schemas.openxmlformats.org/officeDocument/2006/math" xmlns:a14="http://schemas.microsoft.com/office/drawing/2010/main" xmlns:ma14="http://schemas.microsoft.com/office/mac/drawingml/2011/main" val="1"/>
+                  <ma14:wrappingTextBoxFlag xmlns:ma14="http://schemas.microsoft.com/office/mac/drawingml/2011/main" xmlns:a14="http://schemas.microsoft.com/office/drawing/2010/main" xmlns:m="http://schemas.openxmlformats.org/officeDocument/2006/math" xmlns="" val="1"/>
                 </a:ext>
               </a:extLst>
             </p:spPr>
@@ -12982,7 +13078,7 @@
           <a:effectLst/>
           <a:extLst>
             <a:ext uri="{C572A759-6A51-4108-AA02-DFA0A04FC94B}">
-              <ma14:wrappingTextBoxFlag xmlns="" xmlns:m="http://schemas.openxmlformats.org/officeDocument/2006/math" xmlns:a14="http://schemas.microsoft.com/office/drawing/2010/main" xmlns:ma14="http://schemas.microsoft.com/office/mac/drawingml/2011/main" val="1"/>
+              <ma14:wrappingTextBoxFlag xmlns:ma14="http://schemas.microsoft.com/office/mac/drawingml/2011/main" xmlns:a14="http://schemas.microsoft.com/office/drawing/2010/main" xmlns:m="http://schemas.openxmlformats.org/officeDocument/2006/math" xmlns="" val="1"/>
             </a:ext>
           </a:extLst>
         </p:spPr>
@@ -13034,7 +13130,7 @@
           <a:effectLst/>
           <a:extLst>
             <a:ext uri="{C572A759-6A51-4108-AA02-DFA0A04FC94B}">
-              <ma14:wrappingTextBoxFlag xmlns="" xmlns:m="http://schemas.openxmlformats.org/officeDocument/2006/math" xmlns:a14="http://schemas.microsoft.com/office/drawing/2010/main" xmlns:ma14="http://schemas.microsoft.com/office/mac/drawingml/2011/main" val="1"/>
+              <ma14:wrappingTextBoxFlag xmlns:ma14="http://schemas.microsoft.com/office/mac/drawingml/2011/main" xmlns:a14="http://schemas.microsoft.com/office/drawing/2010/main" xmlns:m="http://schemas.openxmlformats.org/officeDocument/2006/math" xmlns="" val="1"/>
             </a:ext>
           </a:extLst>
         </p:spPr>
@@ -13086,7 +13182,7 @@
           <a:effectLst/>
           <a:extLst>
             <a:ext uri="{C572A759-6A51-4108-AA02-DFA0A04FC94B}">
-              <ma14:wrappingTextBoxFlag xmlns="" xmlns:m="http://schemas.openxmlformats.org/officeDocument/2006/math" xmlns:a14="http://schemas.microsoft.com/office/drawing/2010/main" xmlns:ma14="http://schemas.microsoft.com/office/mac/drawingml/2011/main" val="1"/>
+              <ma14:wrappingTextBoxFlag xmlns:ma14="http://schemas.microsoft.com/office/mac/drawingml/2011/main" xmlns:a14="http://schemas.microsoft.com/office/drawing/2010/main" xmlns:m="http://schemas.openxmlformats.org/officeDocument/2006/math" xmlns="" val="1"/>
             </a:ext>
           </a:extLst>
         </p:spPr>
@@ -13123,7 +13219,7 @@
           <p:cNvPr id="7" name="[a preencher]">
             <a:extLst>
               <a:ext uri="{FF2B5EF4-FFF2-40B4-BE49-F238E27FC236}">
-                <a16:creationId xmlns:a16="http://schemas.microsoft.com/office/drawing/2014/main" id="{B68E25D6-4DE2-B372-E4C1-48D12A35F977}"/>
+                <a16:creationId xmlns:a16="http://schemas.microsoft.com/office/drawing/2014/main" xmlns="" id="{B68E25D6-4DE2-B372-E4C1-48D12A35F977}"/>
               </a:ext>
             </a:extLst>
           </p:cNvPr>
@@ -13146,7 +13242,7 @@
           <a:effectLst/>
           <a:extLst>
             <a:ext uri="{C572A759-6A51-4108-AA02-DFA0A04FC94B}">
-              <ma14:wrappingTextBoxFlag xmlns="" xmlns:m="http://schemas.openxmlformats.org/officeDocument/2006/math" xmlns:a14="http://schemas.microsoft.com/office/drawing/2010/main" xmlns:ma14="http://schemas.microsoft.com/office/mac/drawingml/2011/main" val="1"/>
+              <ma14:wrappingTextBoxFlag xmlns:ma14="http://schemas.microsoft.com/office/mac/drawingml/2011/main" xmlns:a14="http://schemas.microsoft.com/office/drawing/2010/main" xmlns:m="http://schemas.openxmlformats.org/officeDocument/2006/math" xmlns="" val="1"/>
             </a:ext>
           </a:extLst>
         </p:spPr>
@@ -13286,7 +13382,7 @@
           <p:cNvPr id="8" name="[a preencher]">
             <a:extLst>
               <a:ext uri="{FF2B5EF4-FFF2-40B4-BE49-F238E27FC236}">
-                <a16:creationId xmlns:a16="http://schemas.microsoft.com/office/drawing/2014/main" id="{415DE415-5C46-5A9C-A586-38FA550529DA}"/>
+                <a16:creationId xmlns:a16="http://schemas.microsoft.com/office/drawing/2014/main" xmlns="" id="{415DE415-5C46-5A9C-A586-38FA550529DA}"/>
               </a:ext>
             </a:extLst>
           </p:cNvPr>
@@ -13309,7 +13405,7 @@
           <a:effectLst/>
           <a:extLst>
             <a:ext uri="{C572A759-6A51-4108-AA02-DFA0A04FC94B}">
-              <ma14:wrappingTextBoxFlag xmlns="" xmlns:m="http://schemas.openxmlformats.org/officeDocument/2006/math" xmlns:a14="http://schemas.microsoft.com/office/drawing/2010/main" xmlns:ma14="http://schemas.microsoft.com/office/mac/drawingml/2011/main" val="1"/>
+              <ma14:wrappingTextBoxFlag xmlns:ma14="http://schemas.microsoft.com/office/mac/drawingml/2011/main" xmlns:a14="http://schemas.microsoft.com/office/drawing/2010/main" xmlns:m="http://schemas.openxmlformats.org/officeDocument/2006/math" xmlns="" val="1"/>
             </a:ext>
           </a:extLst>
         </p:spPr>
@@ -13501,7 +13597,7 @@
               <a:effectLst/>
               <a:extLst>
                 <a:ext uri="{C572A759-6A51-4108-AA02-DFA0A04FC94B}">
-                  <ma14:wrappingTextBoxFlag xmlns="" xmlns:m="http://schemas.openxmlformats.org/officeDocument/2006/math" xmlns:a14="http://schemas.microsoft.com/office/drawing/2010/main" xmlns:ma14="http://schemas.microsoft.com/office/mac/drawingml/2011/main" val="1"/>
+                  <ma14:wrappingTextBoxFlag xmlns:ma14="http://schemas.microsoft.com/office/mac/drawingml/2011/main" xmlns:a14="http://schemas.microsoft.com/office/drawing/2010/main" xmlns:m="http://schemas.openxmlformats.org/officeDocument/2006/math" xmlns="" val="1"/>
                 </a:ext>
               </a:extLst>
             </p:spPr>
@@ -13626,7 +13722,7 @@
                 <a:effectLst/>
                 <a:extLst>
                   <a:ext uri="{C572A759-6A51-4108-AA02-DFA0A04FC94B}">
-                    <ma14:wrappingTextBoxFlag xmlns="" xmlns:m="http://schemas.openxmlformats.org/officeDocument/2006/math" xmlns:a14="http://schemas.microsoft.com/office/drawing/2010/main" xmlns:ma14="http://schemas.microsoft.com/office/mac/drawingml/2011/main" val="1"/>
+                    <ma14:wrappingTextBoxFlag xmlns:ma14="http://schemas.microsoft.com/office/mac/drawingml/2011/main" xmlns:a14="http://schemas.microsoft.com/office/drawing/2010/main" xmlns:m="http://schemas.openxmlformats.org/officeDocument/2006/math" xmlns="" val="1"/>
                   </a:ext>
                 </a:extLst>
               </p:spPr>
@@ -13679,7 +13775,7 @@
               <a:effectLst/>
               <a:extLst>
                 <a:ext uri="{C572A759-6A51-4108-AA02-DFA0A04FC94B}">
-                  <ma14:wrappingTextBoxFlag xmlns="" xmlns:m="http://schemas.openxmlformats.org/officeDocument/2006/math" xmlns:a14="http://schemas.microsoft.com/office/drawing/2010/main" xmlns:ma14="http://schemas.microsoft.com/office/mac/drawingml/2011/main" val="1"/>
+                  <ma14:wrappingTextBoxFlag xmlns:ma14="http://schemas.microsoft.com/office/mac/drawingml/2011/main" xmlns:a14="http://schemas.microsoft.com/office/drawing/2010/main" xmlns:m="http://schemas.openxmlformats.org/officeDocument/2006/math" xmlns="" val="1"/>
                 </a:ext>
               </a:extLst>
             </p:spPr>
@@ -13825,7 +13921,7 @@
           <a:effectLst/>
           <a:extLst>
             <a:ext uri="{C572A759-6A51-4108-AA02-DFA0A04FC94B}">
-              <ma14:wrappingTextBoxFlag xmlns="" xmlns:m="http://schemas.openxmlformats.org/officeDocument/2006/math" xmlns:a14="http://schemas.microsoft.com/office/drawing/2010/main" xmlns:ma14="http://schemas.microsoft.com/office/mac/drawingml/2011/main" val="1"/>
+              <ma14:wrappingTextBoxFlag xmlns:ma14="http://schemas.microsoft.com/office/mac/drawingml/2011/main" xmlns:a14="http://schemas.microsoft.com/office/drawing/2010/main" xmlns:m="http://schemas.openxmlformats.org/officeDocument/2006/math" xmlns="" val="1"/>
             </a:ext>
           </a:extLst>
         </p:spPr>
@@ -13877,7 +13973,7 @@
           <a:effectLst/>
           <a:extLst>
             <a:ext uri="{C572A759-6A51-4108-AA02-DFA0A04FC94B}">
-              <ma14:wrappingTextBoxFlag xmlns="" xmlns:m="http://schemas.openxmlformats.org/officeDocument/2006/math" xmlns:a14="http://schemas.microsoft.com/office/drawing/2010/main" xmlns:ma14="http://schemas.microsoft.com/office/mac/drawingml/2011/main" val="1"/>
+              <ma14:wrappingTextBoxFlag xmlns:ma14="http://schemas.microsoft.com/office/mac/drawingml/2011/main" xmlns:a14="http://schemas.microsoft.com/office/drawing/2010/main" xmlns:m="http://schemas.openxmlformats.org/officeDocument/2006/math" xmlns="" val="1"/>
             </a:ext>
           </a:extLst>
         </p:spPr>
@@ -13929,7 +14025,7 @@
           <a:effectLst/>
           <a:extLst>
             <a:ext uri="{C572A759-6A51-4108-AA02-DFA0A04FC94B}">
-              <ma14:wrappingTextBoxFlag xmlns="" xmlns:m="http://schemas.openxmlformats.org/officeDocument/2006/math" xmlns:a14="http://schemas.microsoft.com/office/drawing/2010/main" xmlns:ma14="http://schemas.microsoft.com/office/mac/drawingml/2011/main" val="1"/>
+              <ma14:wrappingTextBoxFlag xmlns:ma14="http://schemas.microsoft.com/office/mac/drawingml/2011/main" xmlns:a14="http://schemas.microsoft.com/office/drawing/2010/main" xmlns:m="http://schemas.openxmlformats.org/officeDocument/2006/math" xmlns="" val="1"/>
             </a:ext>
           </a:extLst>
         </p:spPr>
@@ -13966,7 +14062,7 @@
           <p:cNvPr id="7" name="[a preencher]">
             <a:extLst>
               <a:ext uri="{FF2B5EF4-FFF2-40B4-BE49-F238E27FC236}">
-                <a16:creationId xmlns:a16="http://schemas.microsoft.com/office/drawing/2014/main" id="{C38A3873-F766-962F-2A94-DC7DE2AC969B}"/>
+                <a16:creationId xmlns:a16="http://schemas.microsoft.com/office/drawing/2014/main" xmlns="" id="{C38A3873-F766-962F-2A94-DC7DE2AC969B}"/>
               </a:ext>
             </a:extLst>
           </p:cNvPr>
@@ -13989,7 +14085,7 @@
           <a:effectLst/>
           <a:extLst>
             <a:ext uri="{C572A759-6A51-4108-AA02-DFA0A04FC94B}">
-              <ma14:wrappingTextBoxFlag xmlns="" xmlns:m="http://schemas.openxmlformats.org/officeDocument/2006/math" xmlns:a14="http://schemas.microsoft.com/office/drawing/2010/main" xmlns:ma14="http://schemas.microsoft.com/office/mac/drawingml/2011/main" val="1"/>
+              <ma14:wrappingTextBoxFlag xmlns:ma14="http://schemas.microsoft.com/office/mac/drawingml/2011/main" xmlns:a14="http://schemas.microsoft.com/office/drawing/2010/main" xmlns:m="http://schemas.openxmlformats.org/officeDocument/2006/math" xmlns="" val="1"/>
             </a:ext>
           </a:extLst>
         </p:spPr>
@@ -14129,7 +14225,7 @@
           <p:cNvPr id="8" name="[a preencher]">
             <a:extLst>
               <a:ext uri="{FF2B5EF4-FFF2-40B4-BE49-F238E27FC236}">
-                <a16:creationId xmlns:a16="http://schemas.microsoft.com/office/drawing/2014/main" id="{61FFB461-8DB6-596A-2116-3645D5DA6ECD}"/>
+                <a16:creationId xmlns:a16="http://schemas.microsoft.com/office/drawing/2014/main" xmlns="" id="{61FFB461-8DB6-596A-2116-3645D5DA6ECD}"/>
               </a:ext>
             </a:extLst>
           </p:cNvPr>
@@ -14152,7 +14248,7 @@
           <a:effectLst/>
           <a:extLst>
             <a:ext uri="{C572A759-6A51-4108-AA02-DFA0A04FC94B}">
-              <ma14:wrappingTextBoxFlag xmlns="" xmlns:m="http://schemas.openxmlformats.org/officeDocument/2006/math" xmlns:a14="http://schemas.microsoft.com/office/drawing/2010/main" xmlns:ma14="http://schemas.microsoft.com/office/mac/drawingml/2011/main" val="1"/>
+              <ma14:wrappingTextBoxFlag xmlns:ma14="http://schemas.microsoft.com/office/mac/drawingml/2011/main" xmlns:a14="http://schemas.microsoft.com/office/drawing/2010/main" xmlns:m="http://schemas.openxmlformats.org/officeDocument/2006/math" xmlns="" val="1"/>
             </a:ext>
           </a:extLst>
         </p:spPr>
@@ -14360,7 +14456,7 @@
               <a:effectLst/>
               <a:extLst>
                 <a:ext uri="{C572A759-6A51-4108-AA02-DFA0A04FC94B}">
-                  <ma14:wrappingTextBoxFlag xmlns="" xmlns:m="http://schemas.openxmlformats.org/officeDocument/2006/math" xmlns:a14="http://schemas.microsoft.com/office/drawing/2010/main" xmlns:ma14="http://schemas.microsoft.com/office/mac/drawingml/2011/main" val="1"/>
+                  <ma14:wrappingTextBoxFlag xmlns:ma14="http://schemas.microsoft.com/office/mac/drawingml/2011/main" xmlns:a14="http://schemas.microsoft.com/office/drawing/2010/main" xmlns:m="http://schemas.openxmlformats.org/officeDocument/2006/math" xmlns="" val="1"/>
                 </a:ext>
               </a:extLst>
             </p:spPr>
@@ -14485,7 +14581,7 @@
                 <a:effectLst/>
                 <a:extLst>
                   <a:ext uri="{C572A759-6A51-4108-AA02-DFA0A04FC94B}">
-                    <ma14:wrappingTextBoxFlag xmlns="" xmlns:m="http://schemas.openxmlformats.org/officeDocument/2006/math" xmlns:a14="http://schemas.microsoft.com/office/drawing/2010/main" xmlns:ma14="http://schemas.microsoft.com/office/mac/drawingml/2011/main" val="1"/>
+                    <ma14:wrappingTextBoxFlag xmlns:ma14="http://schemas.microsoft.com/office/mac/drawingml/2011/main" xmlns:a14="http://schemas.microsoft.com/office/drawing/2010/main" xmlns:m="http://schemas.openxmlformats.org/officeDocument/2006/math" xmlns="" val="1"/>
                   </a:ext>
                 </a:extLst>
               </p:spPr>
@@ -14538,7 +14634,7 @@
               <a:effectLst/>
               <a:extLst>
                 <a:ext uri="{C572A759-6A51-4108-AA02-DFA0A04FC94B}">
-                  <ma14:wrappingTextBoxFlag xmlns="" xmlns:m="http://schemas.openxmlformats.org/officeDocument/2006/math" xmlns:a14="http://schemas.microsoft.com/office/drawing/2010/main" xmlns:ma14="http://schemas.microsoft.com/office/mac/drawingml/2011/main" val="1"/>
+                  <ma14:wrappingTextBoxFlag xmlns:ma14="http://schemas.microsoft.com/office/mac/drawingml/2011/main" xmlns:a14="http://schemas.microsoft.com/office/drawing/2010/main" xmlns:m="http://schemas.openxmlformats.org/officeDocument/2006/math" xmlns="" val="1"/>
                 </a:ext>
               </a:extLst>
             </p:spPr>
@@ -14684,7 +14780,7 @@
           <a:effectLst/>
           <a:extLst>
             <a:ext uri="{C572A759-6A51-4108-AA02-DFA0A04FC94B}">
-              <ma14:wrappingTextBoxFlag xmlns="" xmlns:m="http://schemas.openxmlformats.org/officeDocument/2006/math" xmlns:a14="http://schemas.microsoft.com/office/drawing/2010/main" xmlns:ma14="http://schemas.microsoft.com/office/mac/drawingml/2011/main" val="1"/>
+              <ma14:wrappingTextBoxFlag xmlns:ma14="http://schemas.microsoft.com/office/mac/drawingml/2011/main" xmlns:a14="http://schemas.microsoft.com/office/drawing/2010/main" xmlns:m="http://schemas.openxmlformats.org/officeDocument/2006/math" xmlns="" val="1"/>
             </a:ext>
           </a:extLst>
         </p:spPr>
@@ -14736,7 +14832,7 @@
           <a:effectLst/>
           <a:extLst>
             <a:ext uri="{C572A759-6A51-4108-AA02-DFA0A04FC94B}">
-              <ma14:wrappingTextBoxFlag xmlns="" xmlns:m="http://schemas.openxmlformats.org/officeDocument/2006/math" xmlns:a14="http://schemas.microsoft.com/office/drawing/2010/main" xmlns:ma14="http://schemas.microsoft.com/office/mac/drawingml/2011/main" val="1"/>
+              <ma14:wrappingTextBoxFlag xmlns:ma14="http://schemas.microsoft.com/office/mac/drawingml/2011/main" xmlns:a14="http://schemas.microsoft.com/office/drawing/2010/main" xmlns:m="http://schemas.openxmlformats.org/officeDocument/2006/math" xmlns="" val="1"/>
             </a:ext>
           </a:extLst>
         </p:spPr>
@@ -14788,7 +14884,7 @@
           <a:effectLst/>
           <a:extLst>
             <a:ext uri="{C572A759-6A51-4108-AA02-DFA0A04FC94B}">
-              <ma14:wrappingTextBoxFlag xmlns="" xmlns:m="http://schemas.openxmlformats.org/officeDocument/2006/math" xmlns:a14="http://schemas.microsoft.com/office/drawing/2010/main" xmlns:ma14="http://schemas.microsoft.com/office/mac/drawingml/2011/main" val="1"/>
+              <ma14:wrappingTextBoxFlag xmlns:ma14="http://schemas.microsoft.com/office/mac/drawingml/2011/main" xmlns:a14="http://schemas.microsoft.com/office/drawing/2010/main" xmlns:m="http://schemas.openxmlformats.org/officeDocument/2006/math" xmlns="" val="1"/>
             </a:ext>
           </a:extLst>
         </p:spPr>
@@ -14825,7 +14921,7 @@
           <p:cNvPr id="7" name="[a preencher]">
             <a:extLst>
               <a:ext uri="{FF2B5EF4-FFF2-40B4-BE49-F238E27FC236}">
-                <a16:creationId xmlns:a16="http://schemas.microsoft.com/office/drawing/2014/main" id="{8BCE3770-BE87-F709-CBA5-6B64975F99E2}"/>
+                <a16:creationId xmlns:a16="http://schemas.microsoft.com/office/drawing/2014/main" xmlns="" id="{8BCE3770-BE87-F709-CBA5-6B64975F99E2}"/>
               </a:ext>
             </a:extLst>
           </p:cNvPr>
@@ -14848,7 +14944,7 @@
           <a:effectLst/>
           <a:extLst>
             <a:ext uri="{C572A759-6A51-4108-AA02-DFA0A04FC94B}">
-              <ma14:wrappingTextBoxFlag xmlns="" xmlns:m="http://schemas.openxmlformats.org/officeDocument/2006/math" xmlns:a14="http://schemas.microsoft.com/office/drawing/2010/main" xmlns:ma14="http://schemas.microsoft.com/office/mac/drawingml/2011/main" val="1"/>
+              <ma14:wrappingTextBoxFlag xmlns:ma14="http://schemas.microsoft.com/office/mac/drawingml/2011/main" xmlns:a14="http://schemas.microsoft.com/office/drawing/2010/main" xmlns:m="http://schemas.openxmlformats.org/officeDocument/2006/math" xmlns="" val="1"/>
             </a:ext>
           </a:extLst>
         </p:spPr>
@@ -14988,7 +15084,7 @@
           <p:cNvPr id="8" name="[a preencher]">
             <a:extLst>
               <a:ext uri="{FF2B5EF4-FFF2-40B4-BE49-F238E27FC236}">
-                <a16:creationId xmlns:a16="http://schemas.microsoft.com/office/drawing/2014/main" id="{59245EDA-2C2C-7E1D-CCF2-11BCBE3DCC2E}"/>
+                <a16:creationId xmlns:a16="http://schemas.microsoft.com/office/drawing/2014/main" xmlns="" id="{59245EDA-2C2C-7E1D-CCF2-11BCBE3DCC2E}"/>
               </a:ext>
             </a:extLst>
           </p:cNvPr>
@@ -15011,7 +15107,7 @@
           <a:effectLst/>
           <a:extLst>
             <a:ext uri="{C572A759-6A51-4108-AA02-DFA0A04FC94B}">
-              <ma14:wrappingTextBoxFlag xmlns="" xmlns:m="http://schemas.openxmlformats.org/officeDocument/2006/math" xmlns:a14="http://schemas.microsoft.com/office/drawing/2010/main" xmlns:ma14="http://schemas.microsoft.com/office/mac/drawingml/2011/main" val="1"/>
+              <ma14:wrappingTextBoxFlag xmlns:ma14="http://schemas.microsoft.com/office/mac/drawingml/2011/main" xmlns:a14="http://schemas.microsoft.com/office/drawing/2010/main" xmlns:m="http://schemas.openxmlformats.org/officeDocument/2006/math" xmlns="" val="1"/>
             </a:ext>
           </a:extLst>
         </p:spPr>
@@ -15205,7 +15301,7 @@
               <a:effectLst/>
               <a:extLst>
                 <a:ext uri="{C572A759-6A51-4108-AA02-DFA0A04FC94B}">
-                  <ma14:wrappingTextBoxFlag xmlns="" xmlns:m="http://schemas.openxmlformats.org/officeDocument/2006/math" xmlns:a14="http://schemas.microsoft.com/office/drawing/2010/main" xmlns:ma14="http://schemas.microsoft.com/office/mac/drawingml/2011/main" val="1"/>
+                  <ma14:wrappingTextBoxFlag xmlns:ma14="http://schemas.microsoft.com/office/mac/drawingml/2011/main" xmlns:a14="http://schemas.microsoft.com/office/drawing/2010/main" xmlns:m="http://schemas.openxmlformats.org/officeDocument/2006/math" xmlns="" val="1"/>
                 </a:ext>
               </a:extLst>
             </p:spPr>
@@ -15330,7 +15426,7 @@
                 <a:effectLst/>
                 <a:extLst>
                   <a:ext uri="{C572A759-6A51-4108-AA02-DFA0A04FC94B}">
-                    <ma14:wrappingTextBoxFlag xmlns="" xmlns:m="http://schemas.openxmlformats.org/officeDocument/2006/math" xmlns:a14="http://schemas.microsoft.com/office/drawing/2010/main" xmlns:ma14="http://schemas.microsoft.com/office/mac/drawingml/2011/main" val="1"/>
+                    <ma14:wrappingTextBoxFlag xmlns:ma14="http://schemas.microsoft.com/office/mac/drawingml/2011/main" xmlns:a14="http://schemas.microsoft.com/office/drawing/2010/main" xmlns:m="http://schemas.openxmlformats.org/officeDocument/2006/math" xmlns="" val="1"/>
                   </a:ext>
                 </a:extLst>
               </p:spPr>
@@ -15383,7 +15479,7 @@
               <a:effectLst/>
               <a:extLst>
                 <a:ext uri="{C572A759-6A51-4108-AA02-DFA0A04FC94B}">
-                  <ma14:wrappingTextBoxFlag xmlns="" xmlns:m="http://schemas.openxmlformats.org/officeDocument/2006/math" xmlns:a14="http://schemas.microsoft.com/office/drawing/2010/main" xmlns:ma14="http://schemas.microsoft.com/office/mac/drawingml/2011/main" val="1"/>
+                  <ma14:wrappingTextBoxFlag xmlns:ma14="http://schemas.microsoft.com/office/mac/drawingml/2011/main" xmlns:a14="http://schemas.microsoft.com/office/drawing/2010/main" xmlns:m="http://schemas.openxmlformats.org/officeDocument/2006/math" xmlns="" val="1"/>
                 </a:ext>
               </a:extLst>
             </p:spPr>
@@ -15529,7 +15625,7 @@
           <a:effectLst/>
           <a:extLst>
             <a:ext uri="{C572A759-6A51-4108-AA02-DFA0A04FC94B}">
-              <ma14:wrappingTextBoxFlag xmlns="" xmlns:m="http://schemas.openxmlformats.org/officeDocument/2006/math" xmlns:a14="http://schemas.microsoft.com/office/drawing/2010/main" xmlns:ma14="http://schemas.microsoft.com/office/mac/drawingml/2011/main" val="1"/>
+              <ma14:wrappingTextBoxFlag xmlns:ma14="http://schemas.microsoft.com/office/mac/drawingml/2011/main" xmlns:a14="http://schemas.microsoft.com/office/drawing/2010/main" xmlns:m="http://schemas.openxmlformats.org/officeDocument/2006/math" xmlns="" val="1"/>
             </a:ext>
           </a:extLst>
         </p:spPr>
@@ -15581,7 +15677,7 @@
           <a:effectLst/>
           <a:extLst>
             <a:ext uri="{C572A759-6A51-4108-AA02-DFA0A04FC94B}">
-              <ma14:wrappingTextBoxFlag xmlns="" xmlns:m="http://schemas.openxmlformats.org/officeDocument/2006/math" xmlns:a14="http://schemas.microsoft.com/office/drawing/2010/main" xmlns:ma14="http://schemas.microsoft.com/office/mac/drawingml/2011/main" val="1"/>
+              <ma14:wrappingTextBoxFlag xmlns:ma14="http://schemas.microsoft.com/office/mac/drawingml/2011/main" xmlns:a14="http://schemas.microsoft.com/office/drawing/2010/main" xmlns:m="http://schemas.openxmlformats.org/officeDocument/2006/math" xmlns="" val="1"/>
             </a:ext>
           </a:extLst>
         </p:spPr>
@@ -15633,7 +15729,7 @@
           <a:effectLst/>
           <a:extLst>
             <a:ext uri="{C572A759-6A51-4108-AA02-DFA0A04FC94B}">
-              <ma14:wrappingTextBoxFlag xmlns="" xmlns:m="http://schemas.openxmlformats.org/officeDocument/2006/math" xmlns:a14="http://schemas.microsoft.com/office/drawing/2010/main" xmlns:ma14="http://schemas.microsoft.com/office/mac/drawingml/2011/main" val="1"/>
+              <ma14:wrappingTextBoxFlag xmlns:ma14="http://schemas.microsoft.com/office/mac/drawingml/2011/main" xmlns:a14="http://schemas.microsoft.com/office/drawing/2010/main" xmlns:m="http://schemas.openxmlformats.org/officeDocument/2006/math" xmlns="" val="1"/>
             </a:ext>
           </a:extLst>
         </p:spPr>
@@ -15670,7 +15766,7 @@
           <p:cNvPr id="7" name="[a preencher]">
             <a:extLst>
               <a:ext uri="{FF2B5EF4-FFF2-40B4-BE49-F238E27FC236}">
-                <a16:creationId xmlns:a16="http://schemas.microsoft.com/office/drawing/2014/main" id="{5A3E0384-2839-49BE-2FBC-685CC893FBE2}"/>
+                <a16:creationId xmlns:a16="http://schemas.microsoft.com/office/drawing/2014/main" xmlns="" id="{5A3E0384-2839-49BE-2FBC-685CC893FBE2}"/>
               </a:ext>
             </a:extLst>
           </p:cNvPr>
@@ -15693,7 +15789,7 @@
           <a:effectLst/>
           <a:extLst>
             <a:ext uri="{C572A759-6A51-4108-AA02-DFA0A04FC94B}">
-              <ma14:wrappingTextBoxFlag xmlns="" xmlns:m="http://schemas.openxmlformats.org/officeDocument/2006/math" xmlns:a14="http://schemas.microsoft.com/office/drawing/2010/main" xmlns:ma14="http://schemas.microsoft.com/office/mac/drawingml/2011/main" val="1"/>
+              <ma14:wrappingTextBoxFlag xmlns:ma14="http://schemas.microsoft.com/office/mac/drawingml/2011/main" xmlns:a14="http://schemas.microsoft.com/office/drawing/2010/main" xmlns:m="http://schemas.openxmlformats.org/officeDocument/2006/math" xmlns="" val="1"/>
             </a:ext>
           </a:extLst>
         </p:spPr>
@@ -15833,7 +15929,7 @@
           <p:cNvPr id="8" name="[a preencher]">
             <a:extLst>
               <a:ext uri="{FF2B5EF4-FFF2-40B4-BE49-F238E27FC236}">
-                <a16:creationId xmlns:a16="http://schemas.microsoft.com/office/drawing/2014/main" id="{F4824F91-5E9C-9D39-FCD5-32C4D78C60E0}"/>
+                <a16:creationId xmlns:a16="http://schemas.microsoft.com/office/drawing/2014/main" xmlns="" id="{F4824F91-5E9C-9D39-FCD5-32C4D78C60E0}"/>
               </a:ext>
             </a:extLst>
           </p:cNvPr>
@@ -15856,7 +15952,7 @@
           <a:effectLst/>
           <a:extLst>
             <a:ext uri="{C572A759-6A51-4108-AA02-DFA0A04FC94B}">
-              <ma14:wrappingTextBoxFlag xmlns="" xmlns:m="http://schemas.openxmlformats.org/officeDocument/2006/math" xmlns:a14="http://schemas.microsoft.com/office/drawing/2010/main" xmlns:ma14="http://schemas.microsoft.com/office/mac/drawingml/2011/main" val="1"/>
+              <ma14:wrappingTextBoxFlag xmlns:ma14="http://schemas.microsoft.com/office/mac/drawingml/2011/main" xmlns:a14="http://schemas.microsoft.com/office/drawing/2010/main" xmlns:m="http://schemas.openxmlformats.org/officeDocument/2006/math" xmlns="" val="1"/>
             </a:ext>
           </a:extLst>
         </p:spPr>
@@ -16038,7 +16134,7 @@
               <a:effectLst/>
               <a:extLst>
                 <a:ext uri="{C572A759-6A51-4108-AA02-DFA0A04FC94B}">
-                  <ma14:wrappingTextBoxFlag xmlns="" xmlns:m="http://schemas.openxmlformats.org/officeDocument/2006/math" xmlns:a14="http://schemas.microsoft.com/office/drawing/2010/main" xmlns:ma14="http://schemas.microsoft.com/office/mac/drawingml/2011/main" val="1"/>
+                  <ma14:wrappingTextBoxFlag xmlns:ma14="http://schemas.microsoft.com/office/mac/drawingml/2011/main" xmlns:a14="http://schemas.microsoft.com/office/drawing/2010/main" xmlns:m="http://schemas.openxmlformats.org/officeDocument/2006/math" xmlns="" val="1"/>
                 </a:ext>
               </a:extLst>
             </p:spPr>
@@ -16163,7 +16259,7 @@
                 <a:effectLst/>
                 <a:extLst>
                   <a:ext uri="{C572A759-6A51-4108-AA02-DFA0A04FC94B}">
-                    <ma14:wrappingTextBoxFlag xmlns="" xmlns:m="http://schemas.openxmlformats.org/officeDocument/2006/math" xmlns:a14="http://schemas.microsoft.com/office/drawing/2010/main" xmlns:ma14="http://schemas.microsoft.com/office/mac/drawingml/2011/main" val="1"/>
+                    <ma14:wrappingTextBoxFlag xmlns:ma14="http://schemas.microsoft.com/office/mac/drawingml/2011/main" xmlns:a14="http://schemas.microsoft.com/office/drawing/2010/main" xmlns:m="http://schemas.openxmlformats.org/officeDocument/2006/math" xmlns="" val="1"/>
                   </a:ext>
                 </a:extLst>
               </p:spPr>
@@ -16216,7 +16312,7 @@
               <a:effectLst/>
               <a:extLst>
                 <a:ext uri="{C572A759-6A51-4108-AA02-DFA0A04FC94B}">
-                  <ma14:wrappingTextBoxFlag xmlns="" xmlns:m="http://schemas.openxmlformats.org/officeDocument/2006/math" xmlns:a14="http://schemas.microsoft.com/office/drawing/2010/main" xmlns:ma14="http://schemas.microsoft.com/office/mac/drawingml/2011/main" val="1"/>
+                  <ma14:wrappingTextBoxFlag xmlns:ma14="http://schemas.microsoft.com/office/mac/drawingml/2011/main" xmlns:a14="http://schemas.microsoft.com/office/drawing/2010/main" xmlns:m="http://schemas.openxmlformats.org/officeDocument/2006/math" xmlns="" val="1"/>
                 </a:ext>
               </a:extLst>
             </p:spPr>
@@ -16248,9 +16344,17 @@
                   </a:rPr>
                   <a:t>www.gov.br</a:t>
                 </a:r>
+                <a:r>
+                  <a:rPr lang="pt-BR" dirty="0"/>
+                  <a:t/>
+                </a:r>
                 <a:br>
                   <a:rPr lang="pt-BR" dirty="0"/>
                 </a:br>
+                <a:r>
+                  <a:rPr lang="pt-BR" dirty="0"/>
+                  <a:t/>
+                </a:r>
                 <a:br>
                   <a:rPr lang="pt-BR" dirty="0"/>
                 </a:br>
@@ -16373,7 +16477,7 @@
           <a:effectLst/>
           <a:extLst>
             <a:ext uri="{C572A759-6A51-4108-AA02-DFA0A04FC94B}">
-              <ma14:wrappingTextBoxFlag xmlns="" xmlns:m="http://schemas.openxmlformats.org/officeDocument/2006/math" xmlns:a14="http://schemas.microsoft.com/office/drawing/2010/main" xmlns:ma14="http://schemas.microsoft.com/office/mac/drawingml/2011/main" val="1"/>
+              <ma14:wrappingTextBoxFlag xmlns:ma14="http://schemas.microsoft.com/office/mac/drawingml/2011/main" xmlns:a14="http://schemas.microsoft.com/office/drawing/2010/main" xmlns:m="http://schemas.openxmlformats.org/officeDocument/2006/math" xmlns="" val="1"/>
             </a:ext>
           </a:extLst>
         </p:spPr>
@@ -16425,7 +16529,7 @@
           <a:effectLst/>
           <a:extLst>
             <a:ext uri="{C572A759-6A51-4108-AA02-DFA0A04FC94B}">
-              <ma14:wrappingTextBoxFlag xmlns="" xmlns:m="http://schemas.openxmlformats.org/officeDocument/2006/math" xmlns:a14="http://schemas.microsoft.com/office/drawing/2010/main" xmlns:ma14="http://schemas.microsoft.com/office/mac/drawingml/2011/main" val="1"/>
+              <ma14:wrappingTextBoxFlag xmlns:ma14="http://schemas.microsoft.com/office/mac/drawingml/2011/main" xmlns:a14="http://schemas.microsoft.com/office/drawing/2010/main" xmlns:m="http://schemas.openxmlformats.org/officeDocument/2006/math" xmlns="" val="1"/>
             </a:ext>
           </a:extLst>
         </p:spPr>
@@ -16477,7 +16581,7 @@
           <a:effectLst/>
           <a:extLst>
             <a:ext uri="{C572A759-6A51-4108-AA02-DFA0A04FC94B}">
-              <ma14:wrappingTextBoxFlag xmlns="" xmlns:m="http://schemas.openxmlformats.org/officeDocument/2006/math" xmlns:a14="http://schemas.microsoft.com/office/drawing/2010/main" xmlns:ma14="http://schemas.microsoft.com/office/mac/drawingml/2011/main" val="1"/>
+              <ma14:wrappingTextBoxFlag xmlns:ma14="http://schemas.microsoft.com/office/mac/drawingml/2011/main" xmlns:a14="http://schemas.microsoft.com/office/drawing/2010/main" xmlns:m="http://schemas.openxmlformats.org/officeDocument/2006/math" xmlns="" val="1"/>
             </a:ext>
           </a:extLst>
         </p:spPr>
@@ -16514,7 +16618,7 @@
           <p:cNvPr id="8" name="[a preencher]">
             <a:extLst>
               <a:ext uri="{FF2B5EF4-FFF2-40B4-BE49-F238E27FC236}">
-                <a16:creationId xmlns:a16="http://schemas.microsoft.com/office/drawing/2014/main" id="{CC650E53-3776-F023-F894-541EC7AAB50E}"/>
+                <a16:creationId xmlns:a16="http://schemas.microsoft.com/office/drawing/2014/main" xmlns="" id="{CC650E53-3776-F023-F894-541EC7AAB50E}"/>
               </a:ext>
             </a:extLst>
           </p:cNvPr>
@@ -16537,7 +16641,7 @@
           <a:effectLst/>
           <a:extLst>
             <a:ext uri="{C572A759-6A51-4108-AA02-DFA0A04FC94B}">
-              <ma14:wrappingTextBoxFlag xmlns="" xmlns:m="http://schemas.openxmlformats.org/officeDocument/2006/math" xmlns:a14="http://schemas.microsoft.com/office/drawing/2010/main" xmlns:ma14="http://schemas.microsoft.com/office/mac/drawingml/2011/main" val="1"/>
+              <ma14:wrappingTextBoxFlag xmlns:ma14="http://schemas.microsoft.com/office/mac/drawingml/2011/main" xmlns:a14="http://schemas.microsoft.com/office/drawing/2010/main" xmlns:m="http://schemas.openxmlformats.org/officeDocument/2006/math" xmlns="" val="1"/>
             </a:ext>
           </a:extLst>
         </p:spPr>
@@ -16677,7 +16781,7 @@
           <p:cNvPr id="9" name="[a preencher]">
             <a:extLst>
               <a:ext uri="{FF2B5EF4-FFF2-40B4-BE49-F238E27FC236}">
-                <a16:creationId xmlns:a16="http://schemas.microsoft.com/office/drawing/2014/main" id="{BAAD662E-CA5C-1E30-709B-CC51C968F615}"/>
+                <a16:creationId xmlns:a16="http://schemas.microsoft.com/office/drawing/2014/main" xmlns="" id="{BAAD662E-CA5C-1E30-709B-CC51C968F615}"/>
               </a:ext>
             </a:extLst>
           </p:cNvPr>
@@ -16700,7 +16804,7 @@
           <a:effectLst/>
           <a:extLst>
             <a:ext uri="{C572A759-6A51-4108-AA02-DFA0A04FC94B}">
-              <ma14:wrappingTextBoxFlag xmlns="" xmlns:m="http://schemas.openxmlformats.org/officeDocument/2006/math" xmlns:a14="http://schemas.microsoft.com/office/drawing/2010/main" xmlns:ma14="http://schemas.microsoft.com/office/mac/drawingml/2011/main" val="1"/>
+              <ma14:wrappingTextBoxFlag xmlns:ma14="http://schemas.microsoft.com/office/mac/drawingml/2011/main" xmlns:a14="http://schemas.microsoft.com/office/drawing/2010/main" xmlns:m="http://schemas.openxmlformats.org/officeDocument/2006/math" xmlns="" val="1"/>
             </a:ext>
           </a:extLst>
         </p:spPr>

</xml_diff>